<commit_message>
Clean compile after adding SPI and Direct option. SPI derivative not working yet and needs debugging. debugging
</commit_message>
<xml_diff>
--- a/media/photo/SN76489.pptx
+++ b/media/photo/SN76489.pptx
@@ -261,7 +261,7 @@
           <a:p>
             <a:fld id="{EDE034B4-A68C-4277-826C-D3C2EA8243D2}" type="datetimeFigureOut">
               <a:rPr lang="en-AU" smtClean="0"/>
-              <a:t>10/09/2019</a:t>
+              <a:t>17/09/2019</a:t>
             </a:fld>
             <a:endParaRPr lang="en-AU"/>
           </a:p>
@@ -461,7 +461,7 @@
           <a:p>
             <a:fld id="{EDE034B4-A68C-4277-826C-D3C2EA8243D2}" type="datetimeFigureOut">
               <a:rPr lang="en-AU" smtClean="0"/>
-              <a:t>10/09/2019</a:t>
+              <a:t>17/09/2019</a:t>
             </a:fld>
             <a:endParaRPr lang="en-AU"/>
           </a:p>
@@ -671,7 +671,7 @@
           <a:p>
             <a:fld id="{EDE034B4-A68C-4277-826C-D3C2EA8243D2}" type="datetimeFigureOut">
               <a:rPr lang="en-AU" smtClean="0"/>
-              <a:t>10/09/2019</a:t>
+              <a:t>17/09/2019</a:t>
             </a:fld>
             <a:endParaRPr lang="en-AU"/>
           </a:p>
@@ -871,7 +871,7 @@
           <a:p>
             <a:fld id="{EDE034B4-A68C-4277-826C-D3C2EA8243D2}" type="datetimeFigureOut">
               <a:rPr lang="en-AU" smtClean="0"/>
-              <a:t>10/09/2019</a:t>
+              <a:t>17/09/2019</a:t>
             </a:fld>
             <a:endParaRPr lang="en-AU"/>
           </a:p>
@@ -1147,7 +1147,7 @@
           <a:p>
             <a:fld id="{EDE034B4-A68C-4277-826C-D3C2EA8243D2}" type="datetimeFigureOut">
               <a:rPr lang="en-AU" smtClean="0"/>
-              <a:t>10/09/2019</a:t>
+              <a:t>17/09/2019</a:t>
             </a:fld>
             <a:endParaRPr lang="en-AU"/>
           </a:p>
@@ -1415,7 +1415,7 @@
           <a:p>
             <a:fld id="{EDE034B4-A68C-4277-826C-D3C2EA8243D2}" type="datetimeFigureOut">
               <a:rPr lang="en-AU" smtClean="0"/>
-              <a:t>10/09/2019</a:t>
+              <a:t>17/09/2019</a:t>
             </a:fld>
             <a:endParaRPr lang="en-AU"/>
           </a:p>
@@ -1830,7 +1830,7 @@
           <a:p>
             <a:fld id="{EDE034B4-A68C-4277-826C-D3C2EA8243D2}" type="datetimeFigureOut">
               <a:rPr lang="en-AU" smtClean="0"/>
-              <a:t>10/09/2019</a:t>
+              <a:t>17/09/2019</a:t>
             </a:fld>
             <a:endParaRPr lang="en-AU"/>
           </a:p>
@@ -1972,7 +1972,7 @@
           <a:p>
             <a:fld id="{EDE034B4-A68C-4277-826C-D3C2EA8243D2}" type="datetimeFigureOut">
               <a:rPr lang="en-AU" smtClean="0"/>
-              <a:t>10/09/2019</a:t>
+              <a:t>17/09/2019</a:t>
             </a:fld>
             <a:endParaRPr lang="en-AU"/>
           </a:p>
@@ -2085,7 +2085,7 @@
           <a:p>
             <a:fld id="{EDE034B4-A68C-4277-826C-D3C2EA8243D2}" type="datetimeFigureOut">
               <a:rPr lang="en-AU" smtClean="0"/>
-              <a:t>10/09/2019</a:t>
+              <a:t>17/09/2019</a:t>
             </a:fld>
             <a:endParaRPr lang="en-AU"/>
           </a:p>
@@ -2398,7 +2398,7 @@
           <a:p>
             <a:fld id="{EDE034B4-A68C-4277-826C-D3C2EA8243D2}" type="datetimeFigureOut">
               <a:rPr lang="en-AU" smtClean="0"/>
-              <a:t>10/09/2019</a:t>
+              <a:t>17/09/2019</a:t>
             </a:fld>
             <a:endParaRPr lang="en-AU"/>
           </a:p>
@@ -2687,7 +2687,7 @@
           <a:p>
             <a:fld id="{EDE034B4-A68C-4277-826C-D3C2EA8243D2}" type="datetimeFigureOut">
               <a:rPr lang="en-AU" smtClean="0"/>
-              <a:t>10/09/2019</a:t>
+              <a:t>17/09/2019</a:t>
             </a:fld>
             <a:endParaRPr lang="en-AU"/>
           </a:p>
@@ -2930,7 +2930,7 @@
           <a:p>
             <a:fld id="{EDE034B4-A68C-4277-826C-D3C2EA8243D2}" type="datetimeFigureOut">
               <a:rPr lang="en-AU" smtClean="0"/>
-              <a:t>10/09/2019</a:t>
+              <a:t>17/09/2019</a:t>
             </a:fld>
             <a:endParaRPr lang="en-AU"/>
           </a:p>
@@ -4586,6 +4586,3580 @@
           </a:p>
         </p:txBody>
       </p:sp>
+      <p:grpSp>
+        <p:nvGrpSpPr>
+          <p:cNvPr id="160" name="Group 159">
+            <a:extLst>
+              <a:ext uri="{FF2B5EF4-FFF2-40B4-BE49-F238E27FC236}">
+                <a16:creationId xmlns:a16="http://schemas.microsoft.com/office/drawing/2014/main" id="{1A2EE400-2611-4DE6-A188-9FD5F249330E}"/>
+              </a:ext>
+            </a:extLst>
+          </p:cNvPr>
+          <p:cNvGrpSpPr/>
+          <p:nvPr/>
+        </p:nvGrpSpPr>
+        <p:grpSpPr>
+          <a:xfrm>
+            <a:off x="7655397" y="1018200"/>
+            <a:ext cx="1907807" cy="597233"/>
+            <a:chOff x="7655397" y="1018200"/>
+            <a:chExt cx="1907807" cy="597233"/>
+          </a:xfrm>
+        </p:grpSpPr>
+        <p:grpSp>
+          <p:nvGrpSpPr>
+            <p:cNvPr id="65" name="Group 64">
+              <a:extLst>
+                <a:ext uri="{FF2B5EF4-FFF2-40B4-BE49-F238E27FC236}">
+                  <a16:creationId xmlns:a16="http://schemas.microsoft.com/office/drawing/2014/main" id="{E5CAD25D-E0CD-4899-A718-92DA03781DCD}"/>
+                </a:ext>
+              </a:extLst>
+            </p:cNvPr>
+            <p:cNvGrpSpPr/>
+            <p:nvPr/>
+          </p:nvGrpSpPr>
+          <p:grpSpPr>
+            <a:xfrm>
+              <a:off x="7740664" y="1248721"/>
+              <a:ext cx="1822540" cy="366712"/>
+              <a:chOff x="7740664" y="1248721"/>
+              <a:chExt cx="1822540" cy="366712"/>
+            </a:xfrm>
+          </p:grpSpPr>
+          <p:grpSp>
+            <p:nvGrpSpPr>
+              <p:cNvPr id="17" name="Group 16">
+                <a:extLst>
+                  <a:ext uri="{FF2B5EF4-FFF2-40B4-BE49-F238E27FC236}">
+                    <a16:creationId xmlns:a16="http://schemas.microsoft.com/office/drawing/2014/main" id="{46168655-DEC8-47B9-8858-9878270B6754}"/>
+                  </a:ext>
+                </a:extLst>
+              </p:cNvPr>
+              <p:cNvGrpSpPr/>
+              <p:nvPr/>
+            </p:nvGrpSpPr>
+            <p:grpSpPr>
+              <a:xfrm>
+                <a:off x="7750099" y="1289222"/>
+                <a:ext cx="1764604" cy="283100"/>
+                <a:chOff x="7750099" y="1289222"/>
+                <a:chExt cx="1764604" cy="283100"/>
+              </a:xfrm>
+            </p:grpSpPr>
+            <p:sp>
+              <p:nvSpPr>
+                <p:cNvPr id="3" name="Rectangle 2">
+                  <a:extLst>
+                    <a:ext uri="{FF2B5EF4-FFF2-40B4-BE49-F238E27FC236}">
+                      <a16:creationId xmlns:a16="http://schemas.microsoft.com/office/drawing/2014/main" id="{FA2C8B2E-4F47-4FFE-A12F-DFE03ED3A09A}"/>
+                    </a:ext>
+                  </a:extLst>
+                </p:cNvPr>
+                <p:cNvSpPr/>
+                <p:nvPr/>
+              </p:nvSpPr>
+              <p:spPr>
+                <a:xfrm>
+                  <a:off x="7750099" y="1289425"/>
+                  <a:ext cx="1764604" cy="278781"/>
+                </a:xfrm>
+                <a:prstGeom prst="rect">
+                  <a:avLst/>
+                </a:prstGeom>
+                <a:ln>
+                  <a:solidFill>
+                    <a:schemeClr val="tx1"/>
+                  </a:solidFill>
+                </a:ln>
+              </p:spPr>
+              <p:style>
+                <a:lnRef idx="2">
+                  <a:schemeClr val="accent6"/>
+                </a:lnRef>
+                <a:fillRef idx="1">
+                  <a:schemeClr val="lt1"/>
+                </a:fillRef>
+                <a:effectRef idx="0">
+                  <a:schemeClr val="accent6"/>
+                </a:effectRef>
+                <a:fontRef idx="minor">
+                  <a:schemeClr val="dk1"/>
+                </a:fontRef>
+              </p:style>
+              <p:txBody>
+                <a:bodyPr rtlCol="0" anchor="ctr"/>
+                <a:lstStyle/>
+                <a:p>
+                  <a:pPr algn="ctr"/>
+                  <a:endParaRPr lang="en-AU"/>
+                </a:p>
+              </p:txBody>
+            </p:sp>
+            <p:cxnSp>
+              <p:nvCxnSpPr>
+                <p:cNvPr id="5" name="Straight Connector 4">
+                  <a:extLst>
+                    <a:ext uri="{FF2B5EF4-FFF2-40B4-BE49-F238E27FC236}">
+                      <a16:creationId xmlns:a16="http://schemas.microsoft.com/office/drawing/2014/main" id="{E068B25F-B70D-47FA-84CD-DD109A10D88E}"/>
+                    </a:ext>
+                  </a:extLst>
+                </p:cNvPr>
+                <p:cNvCxnSpPr>
+                  <a:cxnSpLocks/>
+                </p:cNvCxnSpPr>
+                <p:nvPr/>
+              </p:nvCxnSpPr>
+              <p:spPr>
+                <a:xfrm>
+                  <a:off x="7970674" y="1289222"/>
+                  <a:ext cx="0" cy="283100"/>
+                </a:xfrm>
+                <a:prstGeom prst="line">
+                  <a:avLst/>
+                </a:prstGeom>
+                <a:ln>
+                  <a:solidFill>
+                    <a:schemeClr val="tx1"/>
+                  </a:solidFill>
+                </a:ln>
+              </p:spPr>
+              <p:style>
+                <a:lnRef idx="2">
+                  <a:schemeClr val="accent1"/>
+                </a:lnRef>
+                <a:fillRef idx="0">
+                  <a:schemeClr val="accent1"/>
+                </a:fillRef>
+                <a:effectRef idx="1">
+                  <a:schemeClr val="accent1"/>
+                </a:effectRef>
+                <a:fontRef idx="minor">
+                  <a:schemeClr val="tx1"/>
+                </a:fontRef>
+              </p:style>
+            </p:cxnSp>
+            <p:cxnSp>
+              <p:nvCxnSpPr>
+                <p:cNvPr id="36" name="Straight Connector 35">
+                  <a:extLst>
+                    <a:ext uri="{FF2B5EF4-FFF2-40B4-BE49-F238E27FC236}">
+                      <a16:creationId xmlns:a16="http://schemas.microsoft.com/office/drawing/2014/main" id="{8DBDD83F-90FC-43FD-A0B7-9733446BF7BF}"/>
+                    </a:ext>
+                  </a:extLst>
+                </p:cNvPr>
+                <p:cNvCxnSpPr>
+                  <a:cxnSpLocks/>
+                </p:cNvCxnSpPr>
+                <p:nvPr/>
+              </p:nvCxnSpPr>
+              <p:spPr>
+                <a:xfrm>
+                  <a:off x="8191249" y="1515762"/>
+                  <a:ext cx="0" cy="56560"/>
+                </a:xfrm>
+                <a:prstGeom prst="line">
+                  <a:avLst/>
+                </a:prstGeom>
+                <a:ln>
+                  <a:solidFill>
+                    <a:schemeClr val="tx1"/>
+                  </a:solidFill>
+                </a:ln>
+              </p:spPr>
+              <p:style>
+                <a:lnRef idx="2">
+                  <a:schemeClr val="accent1"/>
+                </a:lnRef>
+                <a:fillRef idx="0">
+                  <a:schemeClr val="accent1"/>
+                </a:fillRef>
+                <a:effectRef idx="1">
+                  <a:schemeClr val="accent1"/>
+                </a:effectRef>
+                <a:fontRef idx="minor">
+                  <a:schemeClr val="tx1"/>
+                </a:fontRef>
+              </p:style>
+            </p:cxnSp>
+            <p:cxnSp>
+              <p:nvCxnSpPr>
+                <p:cNvPr id="37" name="Straight Connector 36">
+                  <a:extLst>
+                    <a:ext uri="{FF2B5EF4-FFF2-40B4-BE49-F238E27FC236}">
+                      <a16:creationId xmlns:a16="http://schemas.microsoft.com/office/drawing/2014/main" id="{9313175C-7902-47B6-B960-97F9356BB10A}"/>
+                    </a:ext>
+                  </a:extLst>
+                </p:cNvPr>
+                <p:cNvCxnSpPr>
+                  <a:cxnSpLocks/>
+                </p:cNvCxnSpPr>
+                <p:nvPr/>
+              </p:nvCxnSpPr>
+              <p:spPr>
+                <a:xfrm>
+                  <a:off x="8411824" y="1515762"/>
+                  <a:ext cx="0" cy="56560"/>
+                </a:xfrm>
+                <a:prstGeom prst="line">
+                  <a:avLst/>
+                </a:prstGeom>
+                <a:ln>
+                  <a:solidFill>
+                    <a:schemeClr val="tx1"/>
+                  </a:solidFill>
+                </a:ln>
+              </p:spPr>
+              <p:style>
+                <a:lnRef idx="2">
+                  <a:schemeClr val="accent1"/>
+                </a:lnRef>
+                <a:fillRef idx="0">
+                  <a:schemeClr val="accent1"/>
+                </a:fillRef>
+                <a:effectRef idx="1">
+                  <a:schemeClr val="accent1"/>
+                </a:effectRef>
+                <a:fontRef idx="minor">
+                  <a:schemeClr val="tx1"/>
+                </a:fontRef>
+              </p:style>
+            </p:cxnSp>
+            <p:cxnSp>
+              <p:nvCxnSpPr>
+                <p:cNvPr id="39" name="Straight Connector 38">
+                  <a:extLst>
+                    <a:ext uri="{FF2B5EF4-FFF2-40B4-BE49-F238E27FC236}">
+                      <a16:creationId xmlns:a16="http://schemas.microsoft.com/office/drawing/2014/main" id="{4CBB483C-00B8-4F74-B3CB-D39428655E19}"/>
+                    </a:ext>
+                  </a:extLst>
+                </p:cNvPr>
+                <p:cNvCxnSpPr>
+                  <a:cxnSpLocks/>
+                </p:cNvCxnSpPr>
+                <p:nvPr/>
+              </p:nvCxnSpPr>
+              <p:spPr>
+                <a:xfrm>
+                  <a:off x="8632399" y="1289222"/>
+                  <a:ext cx="0" cy="283100"/>
+                </a:xfrm>
+                <a:prstGeom prst="line">
+                  <a:avLst/>
+                </a:prstGeom>
+                <a:ln>
+                  <a:solidFill>
+                    <a:schemeClr val="tx1"/>
+                  </a:solidFill>
+                </a:ln>
+              </p:spPr>
+              <p:style>
+                <a:lnRef idx="2">
+                  <a:schemeClr val="accent1"/>
+                </a:lnRef>
+                <a:fillRef idx="0">
+                  <a:schemeClr val="accent1"/>
+                </a:fillRef>
+                <a:effectRef idx="1">
+                  <a:schemeClr val="accent1"/>
+                </a:effectRef>
+                <a:fontRef idx="minor">
+                  <a:schemeClr val="tx1"/>
+                </a:fontRef>
+              </p:style>
+            </p:cxnSp>
+            <p:cxnSp>
+              <p:nvCxnSpPr>
+                <p:cNvPr id="40" name="Straight Connector 39">
+                  <a:extLst>
+                    <a:ext uri="{FF2B5EF4-FFF2-40B4-BE49-F238E27FC236}">
+                      <a16:creationId xmlns:a16="http://schemas.microsoft.com/office/drawing/2014/main" id="{C0D62C12-95CA-4DB3-A13D-FA5AEDB77922}"/>
+                    </a:ext>
+                  </a:extLst>
+                </p:cNvPr>
+                <p:cNvCxnSpPr>
+                  <a:cxnSpLocks/>
+                </p:cNvCxnSpPr>
+                <p:nvPr/>
+              </p:nvCxnSpPr>
+              <p:spPr>
+                <a:xfrm>
+                  <a:off x="8852975" y="1515762"/>
+                  <a:ext cx="0" cy="56560"/>
+                </a:xfrm>
+                <a:prstGeom prst="line">
+                  <a:avLst/>
+                </a:prstGeom>
+                <a:ln>
+                  <a:solidFill>
+                    <a:schemeClr val="tx1"/>
+                  </a:solidFill>
+                </a:ln>
+              </p:spPr>
+              <p:style>
+                <a:lnRef idx="2">
+                  <a:schemeClr val="accent1"/>
+                </a:lnRef>
+                <a:fillRef idx="0">
+                  <a:schemeClr val="accent1"/>
+                </a:fillRef>
+                <a:effectRef idx="1">
+                  <a:schemeClr val="accent1"/>
+                </a:effectRef>
+                <a:fontRef idx="minor">
+                  <a:schemeClr val="tx1"/>
+                </a:fontRef>
+              </p:style>
+            </p:cxnSp>
+            <p:cxnSp>
+              <p:nvCxnSpPr>
+                <p:cNvPr id="41" name="Straight Connector 40">
+                  <a:extLst>
+                    <a:ext uri="{FF2B5EF4-FFF2-40B4-BE49-F238E27FC236}">
+                      <a16:creationId xmlns:a16="http://schemas.microsoft.com/office/drawing/2014/main" id="{7788B6F4-F060-486B-BFEC-CADD359E197A}"/>
+                    </a:ext>
+                  </a:extLst>
+                </p:cNvPr>
+                <p:cNvCxnSpPr>
+                  <a:cxnSpLocks/>
+                </p:cNvCxnSpPr>
+                <p:nvPr/>
+              </p:nvCxnSpPr>
+              <p:spPr>
+                <a:xfrm>
+                  <a:off x="9073551" y="1515762"/>
+                  <a:ext cx="0" cy="56560"/>
+                </a:xfrm>
+                <a:prstGeom prst="line">
+                  <a:avLst/>
+                </a:prstGeom>
+                <a:ln>
+                  <a:solidFill>
+                    <a:schemeClr val="tx1"/>
+                  </a:solidFill>
+                </a:ln>
+              </p:spPr>
+              <p:style>
+                <a:lnRef idx="2">
+                  <a:schemeClr val="accent1"/>
+                </a:lnRef>
+                <a:fillRef idx="0">
+                  <a:schemeClr val="accent1"/>
+                </a:fillRef>
+                <a:effectRef idx="1">
+                  <a:schemeClr val="accent1"/>
+                </a:effectRef>
+                <a:fontRef idx="minor">
+                  <a:schemeClr val="tx1"/>
+                </a:fontRef>
+              </p:style>
+            </p:cxnSp>
+            <p:cxnSp>
+              <p:nvCxnSpPr>
+                <p:cNvPr id="42" name="Straight Connector 41">
+                  <a:extLst>
+                    <a:ext uri="{FF2B5EF4-FFF2-40B4-BE49-F238E27FC236}">
+                      <a16:creationId xmlns:a16="http://schemas.microsoft.com/office/drawing/2014/main" id="{9140CDCC-1E05-4480-AD2F-B82C7E749A8C}"/>
+                    </a:ext>
+                  </a:extLst>
+                </p:cNvPr>
+                <p:cNvCxnSpPr>
+                  <a:cxnSpLocks/>
+                </p:cNvCxnSpPr>
+                <p:nvPr/>
+              </p:nvCxnSpPr>
+              <p:spPr>
+                <a:xfrm>
+                  <a:off x="9294127" y="1515762"/>
+                  <a:ext cx="0" cy="56560"/>
+                </a:xfrm>
+                <a:prstGeom prst="line">
+                  <a:avLst/>
+                </a:prstGeom>
+                <a:ln>
+                  <a:solidFill>
+                    <a:schemeClr val="tx1"/>
+                  </a:solidFill>
+                </a:ln>
+              </p:spPr>
+              <p:style>
+                <a:lnRef idx="2">
+                  <a:schemeClr val="accent1"/>
+                </a:lnRef>
+                <a:fillRef idx="0">
+                  <a:schemeClr val="accent1"/>
+                </a:fillRef>
+                <a:effectRef idx="1">
+                  <a:schemeClr val="accent1"/>
+                </a:effectRef>
+                <a:fontRef idx="minor">
+                  <a:schemeClr val="tx1"/>
+                </a:fontRef>
+              </p:style>
+            </p:cxnSp>
+          </p:grpSp>
+          <p:sp>
+            <p:nvSpPr>
+              <p:cNvPr id="24" name="TextBox 23">
+                <a:extLst>
+                  <a:ext uri="{FF2B5EF4-FFF2-40B4-BE49-F238E27FC236}">
+                    <a16:creationId xmlns:a16="http://schemas.microsoft.com/office/drawing/2014/main" id="{B6B0A51B-76EA-48EB-AE7A-B654754DB5DF}"/>
+                  </a:ext>
+                </a:extLst>
+              </p:cNvPr>
+              <p:cNvSpPr txBox="1"/>
+              <p:nvPr/>
+            </p:nvSpPr>
+            <p:spPr>
+              <a:xfrm>
+                <a:off x="7980943" y="1248721"/>
+                <a:ext cx="620683" cy="215444"/>
+              </a:xfrm>
+              <a:prstGeom prst="rect">
+                <a:avLst/>
+              </a:prstGeom>
+              <a:noFill/>
+            </p:spPr>
+            <p:txBody>
+              <a:bodyPr wrap="none" rtlCol="0">
+                <a:spAutoFit/>
+              </a:bodyPr>
+              <a:lstStyle/>
+              <a:p>
+                <a:pPr algn="ctr"/>
+                <a:r>
+                  <a:rPr lang="en-AU" sz="800" dirty="0">
+                    <a:latin typeface="Arial" panose="020B0604020202020204" pitchFamily="34" charset="0"/>
+                    <a:cs typeface="Arial" panose="020B0604020202020204" pitchFamily="34" charset="0"/>
+                  </a:rPr>
+                  <a:t>Reg </a:t>
+                </a:r>
+                <a:r>
+                  <a:rPr lang="en-AU" sz="800" dirty="0" err="1">
+                    <a:latin typeface="Arial" panose="020B0604020202020204" pitchFamily="34" charset="0"/>
+                    <a:cs typeface="Arial" panose="020B0604020202020204" pitchFamily="34" charset="0"/>
+                  </a:rPr>
+                  <a:t>Addr</a:t>
+                </a:r>
+                <a:endParaRPr lang="en-AU" sz="800" dirty="0">
+                  <a:latin typeface="Arial" panose="020B0604020202020204" pitchFamily="34" charset="0"/>
+                  <a:cs typeface="Arial" panose="020B0604020202020204" pitchFamily="34" charset="0"/>
+                </a:endParaRPr>
+              </a:p>
+            </p:txBody>
+          </p:sp>
+          <p:sp>
+            <p:nvSpPr>
+              <p:cNvPr id="66" name="TextBox 65">
+                <a:extLst>
+                  <a:ext uri="{FF2B5EF4-FFF2-40B4-BE49-F238E27FC236}">
+                    <a16:creationId xmlns:a16="http://schemas.microsoft.com/office/drawing/2014/main" id="{6FDF45F7-83FA-4649-AD51-404DF9840CA0}"/>
+                  </a:ext>
+                </a:extLst>
+              </p:cNvPr>
+              <p:cNvSpPr txBox="1"/>
+              <p:nvPr/>
+            </p:nvSpPr>
+            <p:spPr>
+              <a:xfrm>
+                <a:off x="7740664" y="1384601"/>
+                <a:ext cx="248786" cy="230832"/>
+              </a:xfrm>
+              <a:prstGeom prst="rect">
+                <a:avLst/>
+              </a:prstGeom>
+              <a:noFill/>
+            </p:spPr>
+            <p:txBody>
+              <a:bodyPr wrap="none" rtlCol="0" anchor="ctr">
+                <a:spAutoFit/>
+              </a:bodyPr>
+              <a:lstStyle/>
+              <a:p>
+                <a:pPr algn="ctr"/>
+                <a:r>
+                  <a:rPr lang="en-AU" sz="900" dirty="0">
+                    <a:latin typeface="Arial" panose="020B0604020202020204" pitchFamily="34" charset="0"/>
+                    <a:cs typeface="Arial" panose="020B0604020202020204" pitchFamily="34" charset="0"/>
+                  </a:rPr>
+                  <a:t>1</a:t>
+                </a:r>
+              </a:p>
+            </p:txBody>
+          </p:sp>
+          <p:sp>
+            <p:nvSpPr>
+              <p:cNvPr id="67" name="TextBox 66">
+                <a:extLst>
+                  <a:ext uri="{FF2B5EF4-FFF2-40B4-BE49-F238E27FC236}">
+                    <a16:creationId xmlns:a16="http://schemas.microsoft.com/office/drawing/2014/main" id="{7504DD4B-B3DD-4B70-A17D-3DC9B7AA98A3}"/>
+                  </a:ext>
+                </a:extLst>
+              </p:cNvPr>
+              <p:cNvSpPr txBox="1"/>
+              <p:nvPr/>
+            </p:nvSpPr>
+            <p:spPr>
+              <a:xfrm>
+                <a:off x="7916175" y="1384601"/>
+                <a:ext cx="332142" cy="230832"/>
+              </a:xfrm>
+              <a:prstGeom prst="rect">
+                <a:avLst/>
+              </a:prstGeom>
+              <a:noFill/>
+            </p:spPr>
+            <p:txBody>
+              <a:bodyPr wrap="none" rtlCol="0" anchor="ctr">
+                <a:spAutoFit/>
+              </a:bodyPr>
+              <a:lstStyle/>
+              <a:p>
+                <a:pPr algn="ctr"/>
+                <a:r>
+                  <a:rPr lang="en-AU" sz="900" dirty="0">
+                    <a:latin typeface="Arial" panose="020B0604020202020204" pitchFamily="34" charset="0"/>
+                    <a:cs typeface="Arial" panose="020B0604020202020204" pitchFamily="34" charset="0"/>
+                  </a:rPr>
+                  <a:t>R0</a:t>
+                </a:r>
+              </a:p>
+            </p:txBody>
+          </p:sp>
+          <p:sp>
+            <p:nvSpPr>
+              <p:cNvPr id="68" name="TextBox 67">
+                <a:extLst>
+                  <a:ext uri="{FF2B5EF4-FFF2-40B4-BE49-F238E27FC236}">
+                    <a16:creationId xmlns:a16="http://schemas.microsoft.com/office/drawing/2014/main" id="{67211455-2DB9-47F0-BA4A-83D096825977}"/>
+                  </a:ext>
+                </a:extLst>
+              </p:cNvPr>
+              <p:cNvSpPr txBox="1"/>
+              <p:nvPr/>
+            </p:nvSpPr>
+            <p:spPr>
+              <a:xfrm>
+                <a:off x="8141224" y="1384601"/>
+                <a:ext cx="332143" cy="230832"/>
+              </a:xfrm>
+              <a:prstGeom prst="rect">
+                <a:avLst/>
+              </a:prstGeom>
+              <a:noFill/>
+            </p:spPr>
+            <p:txBody>
+              <a:bodyPr wrap="none" rtlCol="0" anchor="ctr">
+                <a:spAutoFit/>
+              </a:bodyPr>
+              <a:lstStyle/>
+              <a:p>
+                <a:pPr algn="ctr"/>
+                <a:r>
+                  <a:rPr lang="en-AU" sz="900" dirty="0">
+                    <a:latin typeface="Arial" panose="020B0604020202020204" pitchFamily="34" charset="0"/>
+                    <a:cs typeface="Arial" panose="020B0604020202020204" pitchFamily="34" charset="0"/>
+                  </a:rPr>
+                  <a:t>R1</a:t>
+                </a:r>
+              </a:p>
+            </p:txBody>
+          </p:sp>
+          <p:sp>
+            <p:nvSpPr>
+              <p:cNvPr id="69" name="TextBox 68">
+                <a:extLst>
+                  <a:ext uri="{FF2B5EF4-FFF2-40B4-BE49-F238E27FC236}">
+                    <a16:creationId xmlns:a16="http://schemas.microsoft.com/office/drawing/2014/main" id="{21E7D284-FE99-45D6-A025-95E91AB80486}"/>
+                  </a:ext>
+                </a:extLst>
+              </p:cNvPr>
+              <p:cNvSpPr txBox="1"/>
+              <p:nvPr/>
+            </p:nvSpPr>
+            <p:spPr>
+              <a:xfrm>
+                <a:off x="8349208" y="1384601"/>
+                <a:ext cx="332143" cy="230832"/>
+              </a:xfrm>
+              <a:prstGeom prst="rect">
+                <a:avLst/>
+              </a:prstGeom>
+              <a:noFill/>
+            </p:spPr>
+            <p:txBody>
+              <a:bodyPr wrap="none" rtlCol="0" anchor="ctr">
+                <a:spAutoFit/>
+              </a:bodyPr>
+              <a:lstStyle/>
+              <a:p>
+                <a:pPr algn="ctr"/>
+                <a:r>
+                  <a:rPr lang="en-AU" sz="900" dirty="0">
+                    <a:latin typeface="Arial" panose="020B0604020202020204" pitchFamily="34" charset="0"/>
+                    <a:cs typeface="Arial" panose="020B0604020202020204" pitchFamily="34" charset="0"/>
+                  </a:rPr>
+                  <a:t>R2</a:t>
+                </a:r>
+              </a:p>
+            </p:txBody>
+          </p:sp>
+          <p:sp>
+            <p:nvSpPr>
+              <p:cNvPr id="70" name="TextBox 69">
+                <a:extLst>
+                  <a:ext uri="{FF2B5EF4-FFF2-40B4-BE49-F238E27FC236}">
+                    <a16:creationId xmlns:a16="http://schemas.microsoft.com/office/drawing/2014/main" id="{90B1E542-BA2C-4E3E-A0CD-3F29EB589C0F}"/>
+                  </a:ext>
+                </a:extLst>
+              </p:cNvPr>
+              <p:cNvSpPr txBox="1"/>
+              <p:nvPr/>
+            </p:nvSpPr>
+            <p:spPr>
+              <a:xfrm>
+                <a:off x="8747193" y="1248721"/>
+                <a:ext cx="643126" cy="215444"/>
+              </a:xfrm>
+              <a:prstGeom prst="rect">
+                <a:avLst/>
+              </a:prstGeom>
+              <a:noFill/>
+            </p:spPr>
+            <p:txBody>
+              <a:bodyPr wrap="none" rtlCol="0">
+                <a:spAutoFit/>
+              </a:bodyPr>
+              <a:lstStyle/>
+              <a:p>
+                <a:pPr algn="ctr"/>
+                <a:r>
+                  <a:rPr lang="en-AU" sz="800" dirty="0">
+                    <a:latin typeface="Arial" panose="020B0604020202020204" pitchFamily="34" charset="0"/>
+                    <a:cs typeface="Arial" panose="020B0604020202020204" pitchFamily="34" charset="0"/>
+                  </a:rPr>
+                  <a:t>Freq Data</a:t>
+                </a:r>
+              </a:p>
+            </p:txBody>
+          </p:sp>
+          <p:sp>
+            <p:nvSpPr>
+              <p:cNvPr id="85" name="TextBox 84">
+                <a:extLst>
+                  <a:ext uri="{FF2B5EF4-FFF2-40B4-BE49-F238E27FC236}">
+                    <a16:creationId xmlns:a16="http://schemas.microsoft.com/office/drawing/2014/main" id="{0B0DCCBE-EB58-462E-A76B-DE0CB45AB86B}"/>
+                  </a:ext>
+                </a:extLst>
+              </p:cNvPr>
+              <p:cNvSpPr txBox="1"/>
+              <p:nvPr/>
+            </p:nvSpPr>
+            <p:spPr>
+              <a:xfrm>
+                <a:off x="8584983" y="1384601"/>
+                <a:ext cx="319318" cy="230832"/>
+              </a:xfrm>
+              <a:prstGeom prst="rect">
+                <a:avLst/>
+              </a:prstGeom>
+              <a:noFill/>
+            </p:spPr>
+            <p:txBody>
+              <a:bodyPr wrap="none" rtlCol="0" anchor="ctr">
+                <a:spAutoFit/>
+              </a:bodyPr>
+              <a:lstStyle/>
+              <a:p>
+                <a:pPr algn="ctr"/>
+                <a:r>
+                  <a:rPr lang="en-AU" sz="900" dirty="0">
+                    <a:latin typeface="Arial" panose="020B0604020202020204" pitchFamily="34" charset="0"/>
+                    <a:cs typeface="Arial" panose="020B0604020202020204" pitchFamily="34" charset="0"/>
+                  </a:rPr>
+                  <a:t>F6</a:t>
+                </a:r>
+              </a:p>
+            </p:txBody>
+          </p:sp>
+          <p:sp>
+            <p:nvSpPr>
+              <p:cNvPr id="87" name="TextBox 86">
+                <a:extLst>
+                  <a:ext uri="{FF2B5EF4-FFF2-40B4-BE49-F238E27FC236}">
+                    <a16:creationId xmlns:a16="http://schemas.microsoft.com/office/drawing/2014/main" id="{3EF5717B-E049-4E45-85DA-33AE12D03C5F}"/>
+                  </a:ext>
+                </a:extLst>
+              </p:cNvPr>
+              <p:cNvSpPr txBox="1"/>
+              <p:nvPr/>
+            </p:nvSpPr>
+            <p:spPr>
+              <a:xfrm>
+                <a:off x="8810402" y="1384601"/>
+                <a:ext cx="319318" cy="230832"/>
+              </a:xfrm>
+              <a:prstGeom prst="rect">
+                <a:avLst/>
+              </a:prstGeom>
+              <a:noFill/>
+            </p:spPr>
+            <p:txBody>
+              <a:bodyPr wrap="none" rtlCol="0" anchor="ctr">
+                <a:spAutoFit/>
+              </a:bodyPr>
+              <a:lstStyle/>
+              <a:p>
+                <a:pPr algn="ctr"/>
+                <a:r>
+                  <a:rPr lang="en-AU" sz="900" dirty="0">
+                    <a:latin typeface="Arial" panose="020B0604020202020204" pitchFamily="34" charset="0"/>
+                    <a:cs typeface="Arial" panose="020B0604020202020204" pitchFamily="34" charset="0"/>
+                  </a:rPr>
+                  <a:t>F7</a:t>
+                </a:r>
+              </a:p>
+            </p:txBody>
+          </p:sp>
+          <p:sp>
+            <p:nvSpPr>
+              <p:cNvPr id="88" name="TextBox 87">
+                <a:extLst>
+                  <a:ext uri="{FF2B5EF4-FFF2-40B4-BE49-F238E27FC236}">
+                    <a16:creationId xmlns:a16="http://schemas.microsoft.com/office/drawing/2014/main" id="{5A817E73-8DE4-45ED-A745-293BE7DE0AE8}"/>
+                  </a:ext>
+                </a:extLst>
+              </p:cNvPr>
+              <p:cNvSpPr txBox="1"/>
+              <p:nvPr/>
+            </p:nvSpPr>
+            <p:spPr>
+              <a:xfrm>
+                <a:off x="9025750" y="1384601"/>
+                <a:ext cx="319318" cy="230832"/>
+              </a:xfrm>
+              <a:prstGeom prst="rect">
+                <a:avLst/>
+              </a:prstGeom>
+              <a:noFill/>
+            </p:spPr>
+            <p:txBody>
+              <a:bodyPr wrap="none" rtlCol="0" anchor="ctr">
+                <a:spAutoFit/>
+              </a:bodyPr>
+              <a:lstStyle/>
+              <a:p>
+                <a:pPr algn="ctr"/>
+                <a:r>
+                  <a:rPr lang="en-AU" sz="900" dirty="0">
+                    <a:latin typeface="Arial" panose="020B0604020202020204" pitchFamily="34" charset="0"/>
+                    <a:cs typeface="Arial" panose="020B0604020202020204" pitchFamily="34" charset="0"/>
+                  </a:rPr>
+                  <a:t>F8</a:t>
+                </a:r>
+              </a:p>
+            </p:txBody>
+          </p:sp>
+          <p:sp>
+            <p:nvSpPr>
+              <p:cNvPr id="89" name="TextBox 88">
+                <a:extLst>
+                  <a:ext uri="{FF2B5EF4-FFF2-40B4-BE49-F238E27FC236}">
+                    <a16:creationId xmlns:a16="http://schemas.microsoft.com/office/drawing/2014/main" id="{481CCD93-A6DB-4CFC-8207-E635602AA22F}"/>
+                  </a:ext>
+                </a:extLst>
+              </p:cNvPr>
+              <p:cNvSpPr txBox="1"/>
+              <p:nvPr/>
+            </p:nvSpPr>
+            <p:spPr>
+              <a:xfrm>
+                <a:off x="9243886" y="1384601"/>
+                <a:ext cx="319318" cy="230832"/>
+              </a:xfrm>
+              <a:prstGeom prst="rect">
+                <a:avLst/>
+              </a:prstGeom>
+              <a:noFill/>
+            </p:spPr>
+            <p:txBody>
+              <a:bodyPr wrap="none" rtlCol="0" anchor="ctr">
+                <a:spAutoFit/>
+              </a:bodyPr>
+              <a:lstStyle/>
+              <a:p>
+                <a:pPr algn="ctr"/>
+                <a:r>
+                  <a:rPr lang="en-AU" sz="900" dirty="0">
+                    <a:latin typeface="Arial" panose="020B0604020202020204" pitchFamily="34" charset="0"/>
+                    <a:cs typeface="Arial" panose="020B0604020202020204" pitchFamily="34" charset="0"/>
+                  </a:rPr>
+                  <a:t>F9</a:t>
+                </a:r>
+              </a:p>
+            </p:txBody>
+          </p:sp>
+        </p:grpSp>
+        <p:sp>
+          <p:nvSpPr>
+            <p:cNvPr id="148" name="TextBox 147">
+              <a:extLst>
+                <a:ext uri="{FF2B5EF4-FFF2-40B4-BE49-F238E27FC236}">
+                  <a16:creationId xmlns:a16="http://schemas.microsoft.com/office/drawing/2014/main" id="{C275CA8D-3A7E-4636-98CB-84B605C9E4E6}"/>
+                </a:ext>
+              </a:extLst>
+            </p:cNvPr>
+            <p:cNvSpPr txBox="1"/>
+            <p:nvPr/>
+          </p:nvSpPr>
+          <p:spPr>
+            <a:xfrm>
+              <a:off x="7655397" y="1018200"/>
+              <a:ext cx="1822615" cy="276999"/>
+            </a:xfrm>
+            <a:prstGeom prst="rect">
+              <a:avLst/>
+            </a:prstGeom>
+            <a:noFill/>
+          </p:spPr>
+          <p:txBody>
+            <a:bodyPr wrap="none" rtlCol="0">
+              <a:spAutoFit/>
+            </a:bodyPr>
+            <a:lstStyle/>
+            <a:p>
+              <a:r>
+                <a:rPr lang="en-AU" sz="1200" dirty="0"/>
+                <a:t>Frequency Setting (2 byte)</a:t>
+              </a:r>
+            </a:p>
+          </p:txBody>
+        </p:sp>
+      </p:grpSp>
+      <p:sp>
+        <p:nvSpPr>
+          <p:cNvPr id="151" name="TextBox 150">
+            <a:extLst>
+              <a:ext uri="{FF2B5EF4-FFF2-40B4-BE49-F238E27FC236}">
+                <a16:creationId xmlns:a16="http://schemas.microsoft.com/office/drawing/2014/main" id="{39A7BB6A-88DB-4DCE-8704-FE4EF1DDB7CA}"/>
+              </a:ext>
+            </a:extLst>
+          </p:cNvPr>
+          <p:cNvSpPr txBox="1"/>
+          <p:nvPr/>
+        </p:nvSpPr>
+        <p:spPr>
+          <a:xfrm>
+            <a:off x="7655513" y="1518558"/>
+            <a:ext cx="375424" cy="215444"/>
+          </a:xfrm>
+          <a:prstGeom prst="rect">
+            <a:avLst/>
+          </a:prstGeom>
+          <a:noFill/>
+        </p:spPr>
+        <p:txBody>
+          <a:bodyPr wrap="none" rtlCol="0">
+            <a:spAutoFit/>
+          </a:bodyPr>
+          <a:lstStyle/>
+          <a:p>
+            <a:r>
+              <a:rPr lang="en-AU" sz="800" dirty="0"/>
+              <a:t>MSB</a:t>
+            </a:r>
+          </a:p>
+        </p:txBody>
+      </p:sp>
+      <p:sp>
+        <p:nvSpPr>
+          <p:cNvPr id="154" name="TextBox 153">
+            <a:extLst>
+              <a:ext uri="{FF2B5EF4-FFF2-40B4-BE49-F238E27FC236}">
+                <a16:creationId xmlns:a16="http://schemas.microsoft.com/office/drawing/2014/main" id="{3B7BDB3D-B6E0-4365-9923-6594DDF67C65}"/>
+              </a:ext>
+            </a:extLst>
+          </p:cNvPr>
+          <p:cNvSpPr txBox="1"/>
+          <p:nvPr/>
+        </p:nvSpPr>
+        <p:spPr>
+          <a:xfrm>
+            <a:off x="9579565" y="1518383"/>
+            <a:ext cx="375424" cy="215444"/>
+          </a:xfrm>
+          <a:prstGeom prst="rect">
+            <a:avLst/>
+          </a:prstGeom>
+          <a:noFill/>
+        </p:spPr>
+        <p:txBody>
+          <a:bodyPr wrap="none" rtlCol="0">
+            <a:spAutoFit/>
+          </a:bodyPr>
+          <a:lstStyle/>
+          <a:p>
+            <a:r>
+              <a:rPr lang="en-AU" sz="800" dirty="0"/>
+              <a:t>MSB</a:t>
+            </a:r>
+          </a:p>
+        </p:txBody>
+      </p:sp>
+      <p:sp>
+        <p:nvSpPr>
+          <p:cNvPr id="155" name="TextBox 154">
+            <a:extLst>
+              <a:ext uri="{FF2B5EF4-FFF2-40B4-BE49-F238E27FC236}">
+                <a16:creationId xmlns:a16="http://schemas.microsoft.com/office/drawing/2014/main" id="{380A68D9-1F9F-4EB9-88CC-3B79468B3790}"/>
+              </a:ext>
+            </a:extLst>
+          </p:cNvPr>
+          <p:cNvSpPr txBox="1"/>
+          <p:nvPr/>
+        </p:nvSpPr>
+        <p:spPr>
+          <a:xfrm>
+            <a:off x="9281203" y="1518383"/>
+            <a:ext cx="330540" cy="215444"/>
+          </a:xfrm>
+          <a:prstGeom prst="rect">
+            <a:avLst/>
+          </a:prstGeom>
+          <a:noFill/>
+        </p:spPr>
+        <p:txBody>
+          <a:bodyPr wrap="none" rtlCol="0">
+            <a:spAutoFit/>
+          </a:bodyPr>
+          <a:lstStyle/>
+          <a:p>
+            <a:pPr algn="r"/>
+            <a:r>
+              <a:rPr lang="en-AU" sz="800" dirty="0"/>
+              <a:t>LSB</a:t>
+            </a:r>
+          </a:p>
+        </p:txBody>
+      </p:sp>
+      <p:grpSp>
+        <p:nvGrpSpPr>
+          <p:cNvPr id="159" name="Group 158">
+            <a:extLst>
+              <a:ext uri="{FF2B5EF4-FFF2-40B4-BE49-F238E27FC236}">
+                <a16:creationId xmlns:a16="http://schemas.microsoft.com/office/drawing/2014/main" id="{1661ED39-62A7-4D63-8636-BB7F9DCBDFB6}"/>
+              </a:ext>
+            </a:extLst>
+          </p:cNvPr>
+          <p:cNvGrpSpPr/>
+          <p:nvPr/>
+        </p:nvGrpSpPr>
+        <p:grpSpPr>
+          <a:xfrm>
+            <a:off x="9660244" y="1248721"/>
+            <a:ext cx="1868480" cy="482485"/>
+            <a:chOff x="9660244" y="1248721"/>
+            <a:chExt cx="1868480" cy="482485"/>
+          </a:xfrm>
+        </p:grpSpPr>
+        <p:grpSp>
+          <p:nvGrpSpPr>
+            <p:cNvPr id="23" name="Group 22">
+              <a:extLst>
+                <a:ext uri="{FF2B5EF4-FFF2-40B4-BE49-F238E27FC236}">
+                  <a16:creationId xmlns:a16="http://schemas.microsoft.com/office/drawing/2014/main" id="{D8F42672-553D-4392-983B-78A5D409B42A}"/>
+                </a:ext>
+              </a:extLst>
+            </p:cNvPr>
+            <p:cNvGrpSpPr/>
+            <p:nvPr/>
+          </p:nvGrpSpPr>
+          <p:grpSpPr>
+            <a:xfrm>
+              <a:off x="9669516" y="1289222"/>
+              <a:ext cx="1764604" cy="283100"/>
+              <a:chOff x="9669516" y="1289222"/>
+              <a:chExt cx="1764604" cy="283100"/>
+            </a:xfrm>
+          </p:grpSpPr>
+          <p:sp>
+            <p:nvSpPr>
+              <p:cNvPr id="54" name="Rectangle 53">
+                <a:extLst>
+                  <a:ext uri="{FF2B5EF4-FFF2-40B4-BE49-F238E27FC236}">
+                    <a16:creationId xmlns:a16="http://schemas.microsoft.com/office/drawing/2014/main" id="{1F51CB07-3FF7-4259-AC29-13809DDD6E10}"/>
+                  </a:ext>
+                </a:extLst>
+              </p:cNvPr>
+              <p:cNvSpPr/>
+              <p:nvPr/>
+            </p:nvSpPr>
+            <p:spPr>
+              <a:xfrm>
+                <a:off x="9669516" y="1289425"/>
+                <a:ext cx="1764604" cy="278781"/>
+              </a:xfrm>
+              <a:prstGeom prst="rect">
+                <a:avLst/>
+              </a:prstGeom>
+              <a:ln>
+                <a:solidFill>
+                  <a:schemeClr val="tx1"/>
+                </a:solidFill>
+              </a:ln>
+            </p:spPr>
+            <p:style>
+              <a:lnRef idx="2">
+                <a:schemeClr val="accent6"/>
+              </a:lnRef>
+              <a:fillRef idx="1">
+                <a:schemeClr val="lt1"/>
+              </a:fillRef>
+              <a:effectRef idx="0">
+                <a:schemeClr val="accent6"/>
+              </a:effectRef>
+              <a:fontRef idx="minor">
+                <a:schemeClr val="dk1"/>
+              </a:fontRef>
+            </p:style>
+            <p:txBody>
+              <a:bodyPr rtlCol="0" anchor="ctr"/>
+              <a:lstStyle/>
+              <a:p>
+                <a:pPr algn="ctr"/>
+                <a:endParaRPr lang="en-AU"/>
+              </a:p>
+            </p:txBody>
+          </p:sp>
+          <p:cxnSp>
+            <p:nvCxnSpPr>
+              <p:cNvPr id="57" name="Straight Connector 56">
+                <a:extLst>
+                  <a:ext uri="{FF2B5EF4-FFF2-40B4-BE49-F238E27FC236}">
+                    <a16:creationId xmlns:a16="http://schemas.microsoft.com/office/drawing/2014/main" id="{7D736BDF-29CE-4EBB-8B54-5DA7BFDF020E}"/>
+                  </a:ext>
+                </a:extLst>
+              </p:cNvPr>
+              <p:cNvCxnSpPr>
+                <a:cxnSpLocks/>
+              </p:cNvCxnSpPr>
+              <p:nvPr/>
+            </p:nvCxnSpPr>
+            <p:spPr>
+              <a:xfrm>
+                <a:off x="9890091" y="1289222"/>
+                <a:ext cx="0" cy="283100"/>
+              </a:xfrm>
+              <a:prstGeom prst="line">
+                <a:avLst/>
+              </a:prstGeom>
+              <a:ln>
+                <a:solidFill>
+                  <a:schemeClr val="tx1"/>
+                </a:solidFill>
+              </a:ln>
+            </p:spPr>
+            <p:style>
+              <a:lnRef idx="2">
+                <a:schemeClr val="accent1"/>
+              </a:lnRef>
+              <a:fillRef idx="0">
+                <a:schemeClr val="accent1"/>
+              </a:fillRef>
+              <a:effectRef idx="1">
+                <a:schemeClr val="accent1"/>
+              </a:effectRef>
+              <a:fontRef idx="minor">
+                <a:schemeClr val="tx1"/>
+              </a:fontRef>
+            </p:style>
+          </p:cxnSp>
+          <p:cxnSp>
+            <p:nvCxnSpPr>
+              <p:cNvPr id="58" name="Straight Connector 57">
+                <a:extLst>
+                  <a:ext uri="{FF2B5EF4-FFF2-40B4-BE49-F238E27FC236}">
+                    <a16:creationId xmlns:a16="http://schemas.microsoft.com/office/drawing/2014/main" id="{51714F59-C816-4004-B49D-196E687EC2BE}"/>
+                  </a:ext>
+                </a:extLst>
+              </p:cNvPr>
+              <p:cNvCxnSpPr>
+                <a:cxnSpLocks/>
+              </p:cNvCxnSpPr>
+              <p:nvPr/>
+            </p:nvCxnSpPr>
+            <p:spPr>
+              <a:xfrm>
+                <a:off x="10110666" y="1515762"/>
+                <a:ext cx="0" cy="56560"/>
+              </a:xfrm>
+              <a:prstGeom prst="line">
+                <a:avLst/>
+              </a:prstGeom>
+              <a:ln>
+                <a:solidFill>
+                  <a:schemeClr val="tx1"/>
+                </a:solidFill>
+              </a:ln>
+            </p:spPr>
+            <p:style>
+              <a:lnRef idx="2">
+                <a:schemeClr val="accent1"/>
+              </a:lnRef>
+              <a:fillRef idx="0">
+                <a:schemeClr val="accent1"/>
+              </a:fillRef>
+              <a:effectRef idx="1">
+                <a:schemeClr val="accent1"/>
+              </a:effectRef>
+              <a:fontRef idx="minor">
+                <a:schemeClr val="tx1"/>
+              </a:fontRef>
+            </p:style>
+          </p:cxnSp>
+          <p:cxnSp>
+            <p:nvCxnSpPr>
+              <p:cNvPr id="59" name="Straight Connector 58">
+                <a:extLst>
+                  <a:ext uri="{FF2B5EF4-FFF2-40B4-BE49-F238E27FC236}">
+                    <a16:creationId xmlns:a16="http://schemas.microsoft.com/office/drawing/2014/main" id="{F688AB9D-DD6B-4264-A6AA-C34D09AB50F1}"/>
+                  </a:ext>
+                </a:extLst>
+              </p:cNvPr>
+              <p:cNvCxnSpPr>
+                <a:cxnSpLocks/>
+              </p:cNvCxnSpPr>
+              <p:nvPr/>
+            </p:nvCxnSpPr>
+            <p:spPr>
+              <a:xfrm>
+                <a:off x="10331241" y="1515762"/>
+                <a:ext cx="0" cy="56560"/>
+              </a:xfrm>
+              <a:prstGeom prst="line">
+                <a:avLst/>
+              </a:prstGeom>
+              <a:ln>
+                <a:solidFill>
+                  <a:schemeClr val="tx1"/>
+                </a:solidFill>
+              </a:ln>
+            </p:spPr>
+            <p:style>
+              <a:lnRef idx="2">
+                <a:schemeClr val="accent1"/>
+              </a:lnRef>
+              <a:fillRef idx="0">
+                <a:schemeClr val="accent1"/>
+              </a:fillRef>
+              <a:effectRef idx="1">
+                <a:schemeClr val="accent1"/>
+              </a:effectRef>
+              <a:fontRef idx="minor">
+                <a:schemeClr val="tx1"/>
+              </a:fontRef>
+            </p:style>
+          </p:cxnSp>
+          <p:cxnSp>
+            <p:nvCxnSpPr>
+              <p:cNvPr id="61" name="Straight Connector 60">
+                <a:extLst>
+                  <a:ext uri="{FF2B5EF4-FFF2-40B4-BE49-F238E27FC236}">
+                    <a16:creationId xmlns:a16="http://schemas.microsoft.com/office/drawing/2014/main" id="{3E140A8F-F9C1-48E7-B7F0-241B1BE38D58}"/>
+                  </a:ext>
+                </a:extLst>
+              </p:cNvPr>
+              <p:cNvCxnSpPr>
+                <a:cxnSpLocks/>
+              </p:cNvCxnSpPr>
+              <p:nvPr/>
+            </p:nvCxnSpPr>
+            <p:spPr>
+              <a:xfrm>
+                <a:off x="10772392" y="1515762"/>
+                <a:ext cx="0" cy="56560"/>
+              </a:xfrm>
+              <a:prstGeom prst="line">
+                <a:avLst/>
+              </a:prstGeom>
+              <a:ln>
+                <a:solidFill>
+                  <a:schemeClr val="tx1"/>
+                </a:solidFill>
+              </a:ln>
+            </p:spPr>
+            <p:style>
+              <a:lnRef idx="2">
+                <a:schemeClr val="accent1"/>
+              </a:lnRef>
+              <a:fillRef idx="0">
+                <a:schemeClr val="accent1"/>
+              </a:fillRef>
+              <a:effectRef idx="1">
+                <a:schemeClr val="accent1"/>
+              </a:effectRef>
+              <a:fontRef idx="minor">
+                <a:schemeClr val="tx1"/>
+              </a:fontRef>
+            </p:style>
+          </p:cxnSp>
+          <p:cxnSp>
+            <p:nvCxnSpPr>
+              <p:cNvPr id="62" name="Straight Connector 61">
+                <a:extLst>
+                  <a:ext uri="{FF2B5EF4-FFF2-40B4-BE49-F238E27FC236}">
+                    <a16:creationId xmlns:a16="http://schemas.microsoft.com/office/drawing/2014/main" id="{89C69084-3F65-43AB-B485-F9D71BCC5904}"/>
+                  </a:ext>
+                </a:extLst>
+              </p:cNvPr>
+              <p:cNvCxnSpPr>
+                <a:cxnSpLocks/>
+              </p:cNvCxnSpPr>
+              <p:nvPr/>
+            </p:nvCxnSpPr>
+            <p:spPr>
+              <a:xfrm>
+                <a:off x="10992968" y="1515762"/>
+                <a:ext cx="0" cy="56560"/>
+              </a:xfrm>
+              <a:prstGeom prst="line">
+                <a:avLst/>
+              </a:prstGeom>
+              <a:ln>
+                <a:solidFill>
+                  <a:schemeClr val="tx1"/>
+                </a:solidFill>
+              </a:ln>
+            </p:spPr>
+            <p:style>
+              <a:lnRef idx="2">
+                <a:schemeClr val="accent1"/>
+              </a:lnRef>
+              <a:fillRef idx="0">
+                <a:schemeClr val="accent1"/>
+              </a:fillRef>
+              <a:effectRef idx="1">
+                <a:schemeClr val="accent1"/>
+              </a:effectRef>
+              <a:fontRef idx="minor">
+                <a:schemeClr val="tx1"/>
+              </a:fontRef>
+            </p:style>
+          </p:cxnSp>
+          <p:cxnSp>
+            <p:nvCxnSpPr>
+              <p:cNvPr id="63" name="Straight Connector 62">
+                <a:extLst>
+                  <a:ext uri="{FF2B5EF4-FFF2-40B4-BE49-F238E27FC236}">
+                    <a16:creationId xmlns:a16="http://schemas.microsoft.com/office/drawing/2014/main" id="{76573138-9B21-4680-90CD-AC0BA485AA46}"/>
+                  </a:ext>
+                </a:extLst>
+              </p:cNvPr>
+              <p:cNvCxnSpPr>
+                <a:cxnSpLocks/>
+              </p:cNvCxnSpPr>
+              <p:nvPr/>
+            </p:nvCxnSpPr>
+            <p:spPr>
+              <a:xfrm>
+                <a:off x="11213544" y="1515762"/>
+                <a:ext cx="0" cy="56560"/>
+              </a:xfrm>
+              <a:prstGeom prst="line">
+                <a:avLst/>
+              </a:prstGeom>
+              <a:ln>
+                <a:solidFill>
+                  <a:schemeClr val="tx1"/>
+                </a:solidFill>
+              </a:ln>
+            </p:spPr>
+            <p:style>
+              <a:lnRef idx="2">
+                <a:schemeClr val="accent1"/>
+              </a:lnRef>
+              <a:fillRef idx="0">
+                <a:schemeClr val="accent1"/>
+              </a:fillRef>
+              <a:effectRef idx="1">
+                <a:schemeClr val="accent1"/>
+              </a:effectRef>
+              <a:fontRef idx="minor">
+                <a:schemeClr val="tx1"/>
+              </a:fontRef>
+            </p:style>
+          </p:cxnSp>
+          <p:cxnSp>
+            <p:nvCxnSpPr>
+              <p:cNvPr id="64" name="Straight Connector 63">
+                <a:extLst>
+                  <a:ext uri="{FF2B5EF4-FFF2-40B4-BE49-F238E27FC236}">
+                    <a16:creationId xmlns:a16="http://schemas.microsoft.com/office/drawing/2014/main" id="{B945FFCD-21A7-415B-8794-A68346367B30}"/>
+                  </a:ext>
+                </a:extLst>
+              </p:cNvPr>
+              <p:cNvCxnSpPr>
+                <a:cxnSpLocks/>
+              </p:cNvCxnSpPr>
+              <p:nvPr/>
+            </p:nvCxnSpPr>
+            <p:spPr>
+              <a:xfrm>
+                <a:off x="10553664" y="1511640"/>
+                <a:ext cx="0" cy="56560"/>
+              </a:xfrm>
+              <a:prstGeom prst="line">
+                <a:avLst/>
+              </a:prstGeom>
+              <a:ln>
+                <a:solidFill>
+                  <a:schemeClr val="tx1"/>
+                </a:solidFill>
+              </a:ln>
+            </p:spPr>
+            <p:style>
+              <a:lnRef idx="2">
+                <a:schemeClr val="accent1"/>
+              </a:lnRef>
+              <a:fillRef idx="0">
+                <a:schemeClr val="accent1"/>
+              </a:fillRef>
+              <a:effectRef idx="1">
+                <a:schemeClr val="accent1"/>
+              </a:effectRef>
+              <a:fontRef idx="minor">
+                <a:schemeClr val="tx1"/>
+              </a:fontRef>
+            </p:style>
+          </p:cxnSp>
+        </p:grpSp>
+        <p:sp>
+          <p:nvSpPr>
+            <p:cNvPr id="71" name="TextBox 70">
+              <a:extLst>
+                <a:ext uri="{FF2B5EF4-FFF2-40B4-BE49-F238E27FC236}">
+                  <a16:creationId xmlns:a16="http://schemas.microsoft.com/office/drawing/2014/main" id="{BD3F37A2-13A7-4D6D-A172-A4C4FD35EC93}"/>
+                </a:ext>
+              </a:extLst>
+            </p:cNvPr>
+            <p:cNvSpPr txBox="1"/>
+            <p:nvPr/>
+          </p:nvSpPr>
+          <p:spPr>
+            <a:xfrm>
+              <a:off x="10230255" y="1248721"/>
+              <a:ext cx="643126" cy="215444"/>
+            </a:xfrm>
+            <a:prstGeom prst="rect">
+              <a:avLst/>
+            </a:prstGeom>
+            <a:noFill/>
+          </p:spPr>
+          <p:txBody>
+            <a:bodyPr wrap="none" rtlCol="0">
+              <a:spAutoFit/>
+            </a:bodyPr>
+            <a:lstStyle/>
+            <a:p>
+              <a:pPr algn="ctr"/>
+              <a:r>
+                <a:rPr lang="en-AU" sz="800" dirty="0">
+                  <a:latin typeface="Arial" panose="020B0604020202020204" pitchFamily="34" charset="0"/>
+                  <a:cs typeface="Arial" panose="020B0604020202020204" pitchFamily="34" charset="0"/>
+                </a:rPr>
+                <a:t>Freq Data</a:t>
+              </a:r>
+            </a:p>
+          </p:txBody>
+        </p:sp>
+        <p:sp>
+          <p:nvSpPr>
+            <p:cNvPr id="72" name="TextBox 71">
+              <a:extLst>
+                <a:ext uri="{FF2B5EF4-FFF2-40B4-BE49-F238E27FC236}">
+                  <a16:creationId xmlns:a16="http://schemas.microsoft.com/office/drawing/2014/main" id="{F2BA2CEA-3923-4B49-8170-4B9A02D1EAB6}"/>
+                </a:ext>
+              </a:extLst>
+            </p:cNvPr>
+            <p:cNvSpPr txBox="1"/>
+            <p:nvPr/>
+          </p:nvSpPr>
+          <p:spPr>
+            <a:xfrm>
+              <a:off x="10064263" y="1386361"/>
+              <a:ext cx="319319" cy="230832"/>
+            </a:xfrm>
+            <a:prstGeom prst="rect">
+              <a:avLst/>
+            </a:prstGeom>
+            <a:noFill/>
+          </p:spPr>
+          <p:txBody>
+            <a:bodyPr wrap="none" rtlCol="0" anchor="ctr">
+              <a:spAutoFit/>
+            </a:bodyPr>
+            <a:lstStyle/>
+            <a:p>
+              <a:pPr algn="ctr"/>
+              <a:r>
+                <a:rPr lang="en-AU" sz="900" dirty="0">
+                  <a:latin typeface="Arial" panose="020B0604020202020204" pitchFamily="34" charset="0"/>
+                  <a:cs typeface="Arial" panose="020B0604020202020204" pitchFamily="34" charset="0"/>
+                </a:rPr>
+                <a:t>F0</a:t>
+              </a:r>
+            </a:p>
+          </p:txBody>
+        </p:sp>
+        <p:sp>
+          <p:nvSpPr>
+            <p:cNvPr id="73" name="TextBox 72">
+              <a:extLst>
+                <a:ext uri="{FF2B5EF4-FFF2-40B4-BE49-F238E27FC236}">
+                  <a16:creationId xmlns:a16="http://schemas.microsoft.com/office/drawing/2014/main" id="{970A26C3-0A89-44A4-A3C6-C5F3B04EB6CC}"/>
+                </a:ext>
+              </a:extLst>
+            </p:cNvPr>
+            <p:cNvSpPr txBox="1"/>
+            <p:nvPr/>
+          </p:nvSpPr>
+          <p:spPr>
+            <a:xfrm>
+              <a:off x="9880595" y="1386361"/>
+              <a:ext cx="242374" cy="230832"/>
+            </a:xfrm>
+            <a:prstGeom prst="rect">
+              <a:avLst/>
+            </a:prstGeom>
+            <a:noFill/>
+          </p:spPr>
+          <p:txBody>
+            <a:bodyPr wrap="none" rtlCol="0" anchor="ctr">
+              <a:spAutoFit/>
+            </a:bodyPr>
+            <a:lstStyle/>
+            <a:p>
+              <a:pPr algn="ctr"/>
+              <a:r>
+                <a:rPr lang="en-AU" sz="900" dirty="0">
+                  <a:latin typeface="Arial" panose="020B0604020202020204" pitchFamily="34" charset="0"/>
+                  <a:cs typeface="Arial" panose="020B0604020202020204" pitchFamily="34" charset="0"/>
+                </a:rPr>
+                <a:t>x</a:t>
+              </a:r>
+            </a:p>
+          </p:txBody>
+        </p:sp>
+        <p:sp>
+          <p:nvSpPr>
+            <p:cNvPr id="77" name="TextBox 76">
+              <a:extLst>
+                <a:ext uri="{FF2B5EF4-FFF2-40B4-BE49-F238E27FC236}">
+                  <a16:creationId xmlns:a16="http://schemas.microsoft.com/office/drawing/2014/main" id="{C02C56DA-C77A-492B-AB86-68AEEDD3C9BF}"/>
+                </a:ext>
+              </a:extLst>
+            </p:cNvPr>
+            <p:cNvSpPr txBox="1"/>
+            <p:nvPr/>
+          </p:nvSpPr>
+          <p:spPr>
+            <a:xfrm>
+              <a:off x="10285944" y="1386361"/>
+              <a:ext cx="319318" cy="230832"/>
+            </a:xfrm>
+            <a:prstGeom prst="rect">
+              <a:avLst/>
+            </a:prstGeom>
+            <a:noFill/>
+          </p:spPr>
+          <p:txBody>
+            <a:bodyPr wrap="none" rtlCol="0" anchor="ctr">
+              <a:spAutoFit/>
+            </a:bodyPr>
+            <a:lstStyle/>
+            <a:p>
+              <a:pPr algn="ctr"/>
+              <a:r>
+                <a:rPr lang="en-AU" sz="900" dirty="0">
+                  <a:latin typeface="Arial" panose="020B0604020202020204" pitchFamily="34" charset="0"/>
+                  <a:cs typeface="Arial" panose="020B0604020202020204" pitchFamily="34" charset="0"/>
+                </a:rPr>
+                <a:t>F1</a:t>
+              </a:r>
+            </a:p>
+          </p:txBody>
+        </p:sp>
+        <p:sp>
+          <p:nvSpPr>
+            <p:cNvPr id="78" name="TextBox 77">
+              <a:extLst>
+                <a:ext uri="{FF2B5EF4-FFF2-40B4-BE49-F238E27FC236}">
+                  <a16:creationId xmlns:a16="http://schemas.microsoft.com/office/drawing/2014/main" id="{5AD11875-1209-4C4B-B348-E6F89276B3A4}"/>
+                </a:ext>
+              </a:extLst>
+            </p:cNvPr>
+            <p:cNvSpPr txBox="1"/>
+            <p:nvPr/>
+          </p:nvSpPr>
+          <p:spPr>
+            <a:xfrm>
+              <a:off x="10504692" y="1386361"/>
+              <a:ext cx="319318" cy="230832"/>
+            </a:xfrm>
+            <a:prstGeom prst="rect">
+              <a:avLst/>
+            </a:prstGeom>
+            <a:noFill/>
+          </p:spPr>
+          <p:txBody>
+            <a:bodyPr wrap="none" rtlCol="0" anchor="ctr">
+              <a:spAutoFit/>
+            </a:bodyPr>
+            <a:lstStyle/>
+            <a:p>
+              <a:pPr algn="ctr"/>
+              <a:r>
+                <a:rPr lang="en-AU" sz="900" dirty="0">
+                  <a:latin typeface="Arial" panose="020B0604020202020204" pitchFamily="34" charset="0"/>
+                  <a:cs typeface="Arial" panose="020B0604020202020204" pitchFamily="34" charset="0"/>
+                </a:rPr>
+                <a:t>F2</a:t>
+              </a:r>
+            </a:p>
+          </p:txBody>
+        </p:sp>
+        <p:sp>
+          <p:nvSpPr>
+            <p:cNvPr id="79" name="TextBox 78">
+              <a:extLst>
+                <a:ext uri="{FF2B5EF4-FFF2-40B4-BE49-F238E27FC236}">
+                  <a16:creationId xmlns:a16="http://schemas.microsoft.com/office/drawing/2014/main" id="{A661E452-C412-44D0-9761-5434FF365C98}"/>
+                </a:ext>
+              </a:extLst>
+            </p:cNvPr>
+            <p:cNvSpPr txBox="1"/>
+            <p:nvPr/>
+          </p:nvSpPr>
+          <p:spPr>
+            <a:xfrm>
+              <a:off x="10723440" y="1386361"/>
+              <a:ext cx="319318" cy="230832"/>
+            </a:xfrm>
+            <a:prstGeom prst="rect">
+              <a:avLst/>
+            </a:prstGeom>
+            <a:noFill/>
+          </p:spPr>
+          <p:txBody>
+            <a:bodyPr wrap="none" rtlCol="0" anchor="ctr">
+              <a:spAutoFit/>
+            </a:bodyPr>
+            <a:lstStyle/>
+            <a:p>
+              <a:pPr algn="ctr"/>
+              <a:r>
+                <a:rPr lang="en-AU" sz="900" dirty="0">
+                  <a:latin typeface="Arial" panose="020B0604020202020204" pitchFamily="34" charset="0"/>
+                  <a:cs typeface="Arial" panose="020B0604020202020204" pitchFamily="34" charset="0"/>
+                </a:rPr>
+                <a:t>F3</a:t>
+              </a:r>
+            </a:p>
+          </p:txBody>
+        </p:sp>
+        <p:sp>
+          <p:nvSpPr>
+            <p:cNvPr id="82" name="TextBox 81">
+              <a:extLst>
+                <a:ext uri="{FF2B5EF4-FFF2-40B4-BE49-F238E27FC236}">
+                  <a16:creationId xmlns:a16="http://schemas.microsoft.com/office/drawing/2014/main" id="{2C33DC94-6D93-487A-BA13-D349028AC995}"/>
+                </a:ext>
+              </a:extLst>
+            </p:cNvPr>
+            <p:cNvSpPr txBox="1"/>
+            <p:nvPr/>
+          </p:nvSpPr>
+          <p:spPr>
+            <a:xfrm>
+              <a:off x="10947903" y="1386361"/>
+              <a:ext cx="319318" cy="230832"/>
+            </a:xfrm>
+            <a:prstGeom prst="rect">
+              <a:avLst/>
+            </a:prstGeom>
+            <a:noFill/>
+          </p:spPr>
+          <p:txBody>
+            <a:bodyPr wrap="none" rtlCol="0" anchor="ctr">
+              <a:spAutoFit/>
+            </a:bodyPr>
+            <a:lstStyle/>
+            <a:p>
+              <a:pPr algn="ctr"/>
+              <a:r>
+                <a:rPr lang="en-AU" sz="900" dirty="0">
+                  <a:latin typeface="Arial" panose="020B0604020202020204" pitchFamily="34" charset="0"/>
+                  <a:cs typeface="Arial" panose="020B0604020202020204" pitchFamily="34" charset="0"/>
+                </a:rPr>
+                <a:t>F4</a:t>
+              </a:r>
+            </a:p>
+          </p:txBody>
+        </p:sp>
+        <p:sp>
+          <p:nvSpPr>
+            <p:cNvPr id="84" name="TextBox 83">
+              <a:extLst>
+                <a:ext uri="{FF2B5EF4-FFF2-40B4-BE49-F238E27FC236}">
+                  <a16:creationId xmlns:a16="http://schemas.microsoft.com/office/drawing/2014/main" id="{19B8A1BA-81E5-4627-BEF6-A7DF52436D5F}"/>
+                </a:ext>
+              </a:extLst>
+            </p:cNvPr>
+            <p:cNvSpPr txBox="1"/>
+            <p:nvPr/>
+          </p:nvSpPr>
+          <p:spPr>
+            <a:xfrm>
+              <a:off x="11159867" y="1385105"/>
+              <a:ext cx="319318" cy="230832"/>
+            </a:xfrm>
+            <a:prstGeom prst="rect">
+              <a:avLst/>
+            </a:prstGeom>
+            <a:noFill/>
+          </p:spPr>
+          <p:txBody>
+            <a:bodyPr wrap="none" rtlCol="0" anchor="ctr">
+              <a:spAutoFit/>
+            </a:bodyPr>
+            <a:lstStyle/>
+            <a:p>
+              <a:pPr algn="ctr"/>
+              <a:r>
+                <a:rPr lang="en-AU" sz="900" dirty="0">
+                  <a:latin typeface="Arial" panose="020B0604020202020204" pitchFamily="34" charset="0"/>
+                  <a:cs typeface="Arial" panose="020B0604020202020204" pitchFamily="34" charset="0"/>
+                </a:rPr>
+                <a:t>F5</a:t>
+              </a:r>
+            </a:p>
+          </p:txBody>
+        </p:sp>
+        <p:sp>
+          <p:nvSpPr>
+            <p:cNvPr id="86" name="TextBox 85">
+              <a:extLst>
+                <a:ext uri="{FF2B5EF4-FFF2-40B4-BE49-F238E27FC236}">
+                  <a16:creationId xmlns:a16="http://schemas.microsoft.com/office/drawing/2014/main" id="{B78117A4-D0B4-4D26-BCA1-12F7C205F9CC}"/>
+                </a:ext>
+              </a:extLst>
+            </p:cNvPr>
+            <p:cNvSpPr txBox="1"/>
+            <p:nvPr/>
+          </p:nvSpPr>
+          <p:spPr>
+            <a:xfrm>
+              <a:off x="9660244" y="1386361"/>
+              <a:ext cx="248787" cy="230832"/>
+            </a:xfrm>
+            <a:prstGeom prst="rect">
+              <a:avLst/>
+            </a:prstGeom>
+            <a:noFill/>
+          </p:spPr>
+          <p:txBody>
+            <a:bodyPr wrap="none" rtlCol="0" anchor="ctr">
+              <a:spAutoFit/>
+            </a:bodyPr>
+            <a:lstStyle/>
+            <a:p>
+              <a:pPr algn="ctr"/>
+              <a:r>
+                <a:rPr lang="en-AU" sz="900" dirty="0">
+                  <a:latin typeface="Arial" panose="020B0604020202020204" pitchFamily="34" charset="0"/>
+                  <a:cs typeface="Arial" panose="020B0604020202020204" pitchFamily="34" charset="0"/>
+                </a:rPr>
+                <a:t>0</a:t>
+              </a:r>
+            </a:p>
+          </p:txBody>
+        </p:sp>
+        <p:sp>
+          <p:nvSpPr>
+            <p:cNvPr id="156" name="TextBox 155">
+              <a:extLst>
+                <a:ext uri="{FF2B5EF4-FFF2-40B4-BE49-F238E27FC236}">
+                  <a16:creationId xmlns:a16="http://schemas.microsoft.com/office/drawing/2014/main" id="{CA85EAF9-34DC-4AC7-97E7-C6C836613614}"/>
+                </a:ext>
+              </a:extLst>
+            </p:cNvPr>
+            <p:cNvSpPr txBox="1"/>
+            <p:nvPr/>
+          </p:nvSpPr>
+          <p:spPr>
+            <a:xfrm>
+              <a:off x="11198184" y="1515762"/>
+              <a:ext cx="330540" cy="215444"/>
+            </a:xfrm>
+            <a:prstGeom prst="rect">
+              <a:avLst/>
+            </a:prstGeom>
+            <a:noFill/>
+          </p:spPr>
+          <p:txBody>
+            <a:bodyPr wrap="none" rtlCol="0">
+              <a:spAutoFit/>
+            </a:bodyPr>
+            <a:lstStyle/>
+            <a:p>
+              <a:pPr algn="r"/>
+              <a:r>
+                <a:rPr lang="en-AU" sz="800" dirty="0"/>
+                <a:t>LSB</a:t>
+              </a:r>
+            </a:p>
+          </p:txBody>
+        </p:sp>
+      </p:grpSp>
+      <p:grpSp>
+        <p:nvGrpSpPr>
+          <p:cNvPr id="161" name="Group 160">
+            <a:extLst>
+              <a:ext uri="{FF2B5EF4-FFF2-40B4-BE49-F238E27FC236}">
+                <a16:creationId xmlns:a16="http://schemas.microsoft.com/office/drawing/2014/main" id="{0E82AEF4-0D25-4423-BC10-D1FB213DA4BE}"/>
+              </a:ext>
+            </a:extLst>
+          </p:cNvPr>
+          <p:cNvGrpSpPr/>
+          <p:nvPr/>
+        </p:nvGrpSpPr>
+        <p:grpSpPr>
+          <a:xfrm>
+            <a:off x="7654049" y="1728948"/>
+            <a:ext cx="1987532" cy="706354"/>
+            <a:chOff x="7654049" y="1728948"/>
+            <a:chExt cx="1987532" cy="706354"/>
+          </a:xfrm>
+        </p:grpSpPr>
+        <p:grpSp>
+          <p:nvGrpSpPr>
+            <p:cNvPr id="49" name="Group 48">
+              <a:extLst>
+                <a:ext uri="{FF2B5EF4-FFF2-40B4-BE49-F238E27FC236}">
+                  <a16:creationId xmlns:a16="http://schemas.microsoft.com/office/drawing/2014/main" id="{E13C01A6-A4B9-4EA3-8147-52C5DDDB789A}"/>
+                </a:ext>
+              </a:extLst>
+            </p:cNvPr>
+            <p:cNvGrpSpPr/>
+            <p:nvPr/>
+          </p:nvGrpSpPr>
+          <p:grpSpPr>
+            <a:xfrm>
+              <a:off x="7740661" y="1953063"/>
+              <a:ext cx="1828951" cy="366712"/>
+              <a:chOff x="7740661" y="1953063"/>
+              <a:chExt cx="1828951" cy="366712"/>
+            </a:xfrm>
+          </p:grpSpPr>
+          <p:grpSp>
+            <p:nvGrpSpPr>
+              <p:cNvPr id="90" name="Group 89">
+                <a:extLst>
+                  <a:ext uri="{FF2B5EF4-FFF2-40B4-BE49-F238E27FC236}">
+                    <a16:creationId xmlns:a16="http://schemas.microsoft.com/office/drawing/2014/main" id="{6833B1F5-3755-4622-B821-F8FA8D07FD29}"/>
+                  </a:ext>
+                </a:extLst>
+              </p:cNvPr>
+              <p:cNvGrpSpPr/>
+              <p:nvPr/>
+            </p:nvGrpSpPr>
+            <p:grpSpPr>
+              <a:xfrm>
+                <a:off x="7750096" y="1993564"/>
+                <a:ext cx="1764604" cy="283100"/>
+                <a:chOff x="7750099" y="1289222"/>
+                <a:chExt cx="1764604" cy="283100"/>
+              </a:xfrm>
+            </p:grpSpPr>
+            <p:sp>
+              <p:nvSpPr>
+                <p:cNvPr id="91" name="Rectangle 90">
+                  <a:extLst>
+                    <a:ext uri="{FF2B5EF4-FFF2-40B4-BE49-F238E27FC236}">
+                      <a16:creationId xmlns:a16="http://schemas.microsoft.com/office/drawing/2014/main" id="{AFC98030-CE01-4A7D-987F-C6CF28C2B6FE}"/>
+                    </a:ext>
+                  </a:extLst>
+                </p:cNvPr>
+                <p:cNvSpPr/>
+                <p:nvPr/>
+              </p:nvSpPr>
+              <p:spPr>
+                <a:xfrm>
+                  <a:off x="7750099" y="1289425"/>
+                  <a:ext cx="1764604" cy="278781"/>
+                </a:xfrm>
+                <a:prstGeom prst="rect">
+                  <a:avLst/>
+                </a:prstGeom>
+                <a:ln>
+                  <a:solidFill>
+                    <a:schemeClr val="tx1"/>
+                  </a:solidFill>
+                </a:ln>
+              </p:spPr>
+              <p:style>
+                <a:lnRef idx="2">
+                  <a:schemeClr val="accent6"/>
+                </a:lnRef>
+                <a:fillRef idx="1">
+                  <a:schemeClr val="lt1"/>
+                </a:fillRef>
+                <a:effectRef idx="0">
+                  <a:schemeClr val="accent6"/>
+                </a:effectRef>
+                <a:fontRef idx="minor">
+                  <a:schemeClr val="dk1"/>
+                </a:fontRef>
+              </p:style>
+              <p:txBody>
+                <a:bodyPr rtlCol="0" anchor="ctr"/>
+                <a:lstStyle/>
+                <a:p>
+                  <a:pPr algn="ctr"/>
+                  <a:endParaRPr lang="en-AU"/>
+                </a:p>
+              </p:txBody>
+            </p:sp>
+            <p:cxnSp>
+              <p:nvCxnSpPr>
+                <p:cNvPr id="92" name="Straight Connector 91">
+                  <a:extLst>
+                    <a:ext uri="{FF2B5EF4-FFF2-40B4-BE49-F238E27FC236}">
+                      <a16:creationId xmlns:a16="http://schemas.microsoft.com/office/drawing/2014/main" id="{27C47D0C-CB1A-48A7-8271-C46CD5039D22}"/>
+                    </a:ext>
+                  </a:extLst>
+                </p:cNvPr>
+                <p:cNvCxnSpPr>
+                  <a:cxnSpLocks/>
+                </p:cNvCxnSpPr>
+                <p:nvPr/>
+              </p:nvCxnSpPr>
+              <p:spPr>
+                <a:xfrm>
+                  <a:off x="7970674" y="1289222"/>
+                  <a:ext cx="0" cy="283100"/>
+                </a:xfrm>
+                <a:prstGeom prst="line">
+                  <a:avLst/>
+                </a:prstGeom>
+                <a:ln>
+                  <a:solidFill>
+                    <a:schemeClr val="tx1"/>
+                  </a:solidFill>
+                </a:ln>
+              </p:spPr>
+              <p:style>
+                <a:lnRef idx="2">
+                  <a:schemeClr val="accent1"/>
+                </a:lnRef>
+                <a:fillRef idx="0">
+                  <a:schemeClr val="accent1"/>
+                </a:fillRef>
+                <a:effectRef idx="1">
+                  <a:schemeClr val="accent1"/>
+                </a:effectRef>
+                <a:fontRef idx="minor">
+                  <a:schemeClr val="tx1"/>
+                </a:fontRef>
+              </p:style>
+            </p:cxnSp>
+            <p:cxnSp>
+              <p:nvCxnSpPr>
+                <p:cNvPr id="93" name="Straight Connector 92">
+                  <a:extLst>
+                    <a:ext uri="{FF2B5EF4-FFF2-40B4-BE49-F238E27FC236}">
+                      <a16:creationId xmlns:a16="http://schemas.microsoft.com/office/drawing/2014/main" id="{931F7404-EF4D-4B2A-99CE-5CA524CE780F}"/>
+                    </a:ext>
+                  </a:extLst>
+                </p:cNvPr>
+                <p:cNvCxnSpPr>
+                  <a:cxnSpLocks/>
+                </p:cNvCxnSpPr>
+                <p:nvPr/>
+              </p:nvCxnSpPr>
+              <p:spPr>
+                <a:xfrm>
+                  <a:off x="8191249" y="1515762"/>
+                  <a:ext cx="0" cy="56560"/>
+                </a:xfrm>
+                <a:prstGeom prst="line">
+                  <a:avLst/>
+                </a:prstGeom>
+                <a:ln>
+                  <a:solidFill>
+                    <a:schemeClr val="tx1"/>
+                  </a:solidFill>
+                </a:ln>
+              </p:spPr>
+              <p:style>
+                <a:lnRef idx="2">
+                  <a:schemeClr val="accent1"/>
+                </a:lnRef>
+                <a:fillRef idx="0">
+                  <a:schemeClr val="accent1"/>
+                </a:fillRef>
+                <a:effectRef idx="1">
+                  <a:schemeClr val="accent1"/>
+                </a:effectRef>
+                <a:fontRef idx="minor">
+                  <a:schemeClr val="tx1"/>
+                </a:fontRef>
+              </p:style>
+            </p:cxnSp>
+            <p:cxnSp>
+              <p:nvCxnSpPr>
+                <p:cNvPr id="94" name="Straight Connector 93">
+                  <a:extLst>
+                    <a:ext uri="{FF2B5EF4-FFF2-40B4-BE49-F238E27FC236}">
+                      <a16:creationId xmlns:a16="http://schemas.microsoft.com/office/drawing/2014/main" id="{20975B03-6DE9-4D07-99C3-CF57737B72CD}"/>
+                    </a:ext>
+                  </a:extLst>
+                </p:cNvPr>
+                <p:cNvCxnSpPr>
+                  <a:cxnSpLocks/>
+                </p:cNvCxnSpPr>
+                <p:nvPr/>
+              </p:nvCxnSpPr>
+              <p:spPr>
+                <a:xfrm>
+                  <a:off x="8411824" y="1515762"/>
+                  <a:ext cx="0" cy="56560"/>
+                </a:xfrm>
+                <a:prstGeom prst="line">
+                  <a:avLst/>
+                </a:prstGeom>
+                <a:ln>
+                  <a:solidFill>
+                    <a:schemeClr val="tx1"/>
+                  </a:solidFill>
+                </a:ln>
+              </p:spPr>
+              <p:style>
+                <a:lnRef idx="2">
+                  <a:schemeClr val="accent1"/>
+                </a:lnRef>
+                <a:fillRef idx="0">
+                  <a:schemeClr val="accent1"/>
+                </a:fillRef>
+                <a:effectRef idx="1">
+                  <a:schemeClr val="accent1"/>
+                </a:effectRef>
+                <a:fontRef idx="minor">
+                  <a:schemeClr val="tx1"/>
+                </a:fontRef>
+              </p:style>
+            </p:cxnSp>
+            <p:cxnSp>
+              <p:nvCxnSpPr>
+                <p:cNvPr id="95" name="Straight Connector 94">
+                  <a:extLst>
+                    <a:ext uri="{FF2B5EF4-FFF2-40B4-BE49-F238E27FC236}">
+                      <a16:creationId xmlns:a16="http://schemas.microsoft.com/office/drawing/2014/main" id="{DF5404B8-5716-4691-ADF6-F52FEF3719C2}"/>
+                    </a:ext>
+                  </a:extLst>
+                </p:cNvPr>
+                <p:cNvCxnSpPr>
+                  <a:cxnSpLocks/>
+                </p:cNvCxnSpPr>
+                <p:nvPr/>
+              </p:nvCxnSpPr>
+              <p:spPr>
+                <a:xfrm>
+                  <a:off x="8632399" y="1289222"/>
+                  <a:ext cx="0" cy="283100"/>
+                </a:xfrm>
+                <a:prstGeom prst="line">
+                  <a:avLst/>
+                </a:prstGeom>
+                <a:ln>
+                  <a:solidFill>
+                    <a:schemeClr val="tx1"/>
+                  </a:solidFill>
+                </a:ln>
+              </p:spPr>
+              <p:style>
+                <a:lnRef idx="2">
+                  <a:schemeClr val="accent1"/>
+                </a:lnRef>
+                <a:fillRef idx="0">
+                  <a:schemeClr val="accent1"/>
+                </a:fillRef>
+                <a:effectRef idx="1">
+                  <a:schemeClr val="accent1"/>
+                </a:effectRef>
+                <a:fontRef idx="minor">
+                  <a:schemeClr val="tx1"/>
+                </a:fontRef>
+              </p:style>
+            </p:cxnSp>
+            <p:cxnSp>
+              <p:nvCxnSpPr>
+                <p:cNvPr id="96" name="Straight Connector 95">
+                  <a:extLst>
+                    <a:ext uri="{FF2B5EF4-FFF2-40B4-BE49-F238E27FC236}">
+                      <a16:creationId xmlns:a16="http://schemas.microsoft.com/office/drawing/2014/main" id="{BFA47084-14A1-41A2-9855-A8F12CFD3C9F}"/>
+                    </a:ext>
+                  </a:extLst>
+                </p:cNvPr>
+                <p:cNvCxnSpPr>
+                  <a:cxnSpLocks/>
+                </p:cNvCxnSpPr>
+                <p:nvPr/>
+              </p:nvCxnSpPr>
+              <p:spPr>
+                <a:xfrm flipH="1">
+                  <a:off x="8852975" y="1289222"/>
+                  <a:ext cx="3" cy="283100"/>
+                </a:xfrm>
+                <a:prstGeom prst="line">
+                  <a:avLst/>
+                </a:prstGeom>
+                <a:ln>
+                  <a:solidFill>
+                    <a:schemeClr val="tx1"/>
+                  </a:solidFill>
+                </a:ln>
+              </p:spPr>
+              <p:style>
+                <a:lnRef idx="2">
+                  <a:schemeClr val="accent1"/>
+                </a:lnRef>
+                <a:fillRef idx="0">
+                  <a:schemeClr val="accent1"/>
+                </a:fillRef>
+                <a:effectRef idx="1">
+                  <a:schemeClr val="accent1"/>
+                </a:effectRef>
+                <a:fontRef idx="minor">
+                  <a:schemeClr val="tx1"/>
+                </a:fontRef>
+              </p:style>
+            </p:cxnSp>
+            <p:cxnSp>
+              <p:nvCxnSpPr>
+                <p:cNvPr id="97" name="Straight Connector 96">
+                  <a:extLst>
+                    <a:ext uri="{FF2B5EF4-FFF2-40B4-BE49-F238E27FC236}">
+                      <a16:creationId xmlns:a16="http://schemas.microsoft.com/office/drawing/2014/main" id="{90D8FEB5-FDEF-4D6A-BBAF-A36ACCB19857}"/>
+                    </a:ext>
+                  </a:extLst>
+                </p:cNvPr>
+                <p:cNvCxnSpPr>
+                  <a:cxnSpLocks/>
+                </p:cNvCxnSpPr>
+                <p:nvPr/>
+              </p:nvCxnSpPr>
+              <p:spPr>
+                <a:xfrm>
+                  <a:off x="9073551" y="1289222"/>
+                  <a:ext cx="0" cy="283100"/>
+                </a:xfrm>
+                <a:prstGeom prst="line">
+                  <a:avLst/>
+                </a:prstGeom>
+                <a:ln>
+                  <a:solidFill>
+                    <a:schemeClr val="tx1"/>
+                  </a:solidFill>
+                </a:ln>
+              </p:spPr>
+              <p:style>
+                <a:lnRef idx="2">
+                  <a:schemeClr val="accent1"/>
+                </a:lnRef>
+                <a:fillRef idx="0">
+                  <a:schemeClr val="accent1"/>
+                </a:fillRef>
+                <a:effectRef idx="1">
+                  <a:schemeClr val="accent1"/>
+                </a:effectRef>
+                <a:fontRef idx="minor">
+                  <a:schemeClr val="tx1"/>
+                </a:fontRef>
+              </p:style>
+            </p:cxnSp>
+            <p:cxnSp>
+              <p:nvCxnSpPr>
+                <p:cNvPr id="98" name="Straight Connector 97">
+                  <a:extLst>
+                    <a:ext uri="{FF2B5EF4-FFF2-40B4-BE49-F238E27FC236}">
+                      <a16:creationId xmlns:a16="http://schemas.microsoft.com/office/drawing/2014/main" id="{58A6A89B-4B52-4C71-9DF7-C356442AA26A}"/>
+                    </a:ext>
+                  </a:extLst>
+                </p:cNvPr>
+                <p:cNvCxnSpPr>
+                  <a:cxnSpLocks/>
+                </p:cNvCxnSpPr>
+                <p:nvPr/>
+              </p:nvCxnSpPr>
+              <p:spPr>
+                <a:xfrm>
+                  <a:off x="9294127" y="1515762"/>
+                  <a:ext cx="0" cy="56560"/>
+                </a:xfrm>
+                <a:prstGeom prst="line">
+                  <a:avLst/>
+                </a:prstGeom>
+                <a:ln>
+                  <a:solidFill>
+                    <a:schemeClr val="tx1"/>
+                  </a:solidFill>
+                </a:ln>
+              </p:spPr>
+              <p:style>
+                <a:lnRef idx="2">
+                  <a:schemeClr val="accent1"/>
+                </a:lnRef>
+                <a:fillRef idx="0">
+                  <a:schemeClr val="accent1"/>
+                </a:fillRef>
+                <a:effectRef idx="1">
+                  <a:schemeClr val="accent1"/>
+                </a:effectRef>
+                <a:fontRef idx="minor">
+                  <a:schemeClr val="tx1"/>
+                </a:fontRef>
+              </p:style>
+            </p:cxnSp>
+          </p:grpSp>
+          <p:sp>
+            <p:nvSpPr>
+              <p:cNvPr id="100" name="TextBox 99">
+                <a:extLst>
+                  <a:ext uri="{FF2B5EF4-FFF2-40B4-BE49-F238E27FC236}">
+                    <a16:creationId xmlns:a16="http://schemas.microsoft.com/office/drawing/2014/main" id="{48C4A4F7-8FE3-4CBF-9760-7683787FAF53}"/>
+                  </a:ext>
+                </a:extLst>
+              </p:cNvPr>
+              <p:cNvSpPr txBox="1"/>
+              <p:nvPr/>
+            </p:nvSpPr>
+            <p:spPr>
+              <a:xfrm>
+                <a:off x="7740661" y="2088943"/>
+                <a:ext cx="248786" cy="230832"/>
+              </a:xfrm>
+              <a:prstGeom prst="rect">
+                <a:avLst/>
+              </a:prstGeom>
+              <a:noFill/>
+            </p:spPr>
+            <p:txBody>
+              <a:bodyPr wrap="none" rtlCol="0" anchor="ctr">
+                <a:spAutoFit/>
+              </a:bodyPr>
+              <a:lstStyle/>
+              <a:p>
+                <a:pPr algn="ctr"/>
+                <a:r>
+                  <a:rPr lang="en-AU" sz="900" dirty="0">
+                    <a:latin typeface="Arial" panose="020B0604020202020204" pitchFamily="34" charset="0"/>
+                    <a:cs typeface="Arial" panose="020B0604020202020204" pitchFamily="34" charset="0"/>
+                  </a:rPr>
+                  <a:t>1</a:t>
+                </a:r>
+              </a:p>
+            </p:txBody>
+          </p:sp>
+          <p:sp>
+            <p:nvSpPr>
+              <p:cNvPr id="101" name="TextBox 100">
+                <a:extLst>
+                  <a:ext uri="{FF2B5EF4-FFF2-40B4-BE49-F238E27FC236}">
+                    <a16:creationId xmlns:a16="http://schemas.microsoft.com/office/drawing/2014/main" id="{47A9FA07-0D84-43E6-AC00-1D5B9614690F}"/>
+                  </a:ext>
+                </a:extLst>
+              </p:cNvPr>
+              <p:cNvSpPr txBox="1"/>
+              <p:nvPr/>
+            </p:nvSpPr>
+            <p:spPr>
+              <a:xfrm>
+                <a:off x="7916172" y="2088943"/>
+                <a:ext cx="332142" cy="230832"/>
+              </a:xfrm>
+              <a:prstGeom prst="rect">
+                <a:avLst/>
+              </a:prstGeom>
+              <a:noFill/>
+            </p:spPr>
+            <p:txBody>
+              <a:bodyPr wrap="none" rtlCol="0" anchor="ctr">
+                <a:spAutoFit/>
+              </a:bodyPr>
+              <a:lstStyle/>
+              <a:p>
+                <a:pPr algn="ctr"/>
+                <a:r>
+                  <a:rPr lang="en-AU" sz="900" dirty="0">
+                    <a:latin typeface="Arial" panose="020B0604020202020204" pitchFamily="34" charset="0"/>
+                    <a:cs typeface="Arial" panose="020B0604020202020204" pitchFamily="34" charset="0"/>
+                  </a:rPr>
+                  <a:t>R0</a:t>
+                </a:r>
+              </a:p>
+            </p:txBody>
+          </p:sp>
+          <p:sp>
+            <p:nvSpPr>
+              <p:cNvPr id="102" name="TextBox 101">
+                <a:extLst>
+                  <a:ext uri="{FF2B5EF4-FFF2-40B4-BE49-F238E27FC236}">
+                    <a16:creationId xmlns:a16="http://schemas.microsoft.com/office/drawing/2014/main" id="{E6EAD1A7-1CAF-468F-B242-916751BE5468}"/>
+                  </a:ext>
+                </a:extLst>
+              </p:cNvPr>
+              <p:cNvSpPr txBox="1"/>
+              <p:nvPr/>
+            </p:nvSpPr>
+            <p:spPr>
+              <a:xfrm>
+                <a:off x="8141221" y="2088943"/>
+                <a:ext cx="332143" cy="230832"/>
+              </a:xfrm>
+              <a:prstGeom prst="rect">
+                <a:avLst/>
+              </a:prstGeom>
+              <a:noFill/>
+            </p:spPr>
+            <p:txBody>
+              <a:bodyPr wrap="none" rtlCol="0" anchor="ctr">
+                <a:spAutoFit/>
+              </a:bodyPr>
+              <a:lstStyle/>
+              <a:p>
+                <a:pPr algn="ctr"/>
+                <a:r>
+                  <a:rPr lang="en-AU" sz="900" dirty="0">
+                    <a:latin typeface="Arial" panose="020B0604020202020204" pitchFamily="34" charset="0"/>
+                    <a:cs typeface="Arial" panose="020B0604020202020204" pitchFamily="34" charset="0"/>
+                  </a:rPr>
+                  <a:t>R1</a:t>
+                </a:r>
+              </a:p>
+            </p:txBody>
+          </p:sp>
+          <p:sp>
+            <p:nvSpPr>
+              <p:cNvPr id="103" name="TextBox 102">
+                <a:extLst>
+                  <a:ext uri="{FF2B5EF4-FFF2-40B4-BE49-F238E27FC236}">
+                    <a16:creationId xmlns:a16="http://schemas.microsoft.com/office/drawing/2014/main" id="{FC52A46C-33C2-440C-BEDC-6A57ED24A625}"/>
+                  </a:ext>
+                </a:extLst>
+              </p:cNvPr>
+              <p:cNvSpPr txBox="1"/>
+              <p:nvPr/>
+            </p:nvSpPr>
+            <p:spPr>
+              <a:xfrm>
+                <a:off x="8349205" y="2088943"/>
+                <a:ext cx="332143" cy="230832"/>
+              </a:xfrm>
+              <a:prstGeom prst="rect">
+                <a:avLst/>
+              </a:prstGeom>
+              <a:noFill/>
+            </p:spPr>
+            <p:txBody>
+              <a:bodyPr wrap="none" rtlCol="0" anchor="ctr">
+                <a:spAutoFit/>
+              </a:bodyPr>
+              <a:lstStyle/>
+              <a:p>
+                <a:pPr algn="ctr"/>
+                <a:r>
+                  <a:rPr lang="en-AU" sz="900" dirty="0">
+                    <a:latin typeface="Arial" panose="020B0604020202020204" pitchFamily="34" charset="0"/>
+                    <a:cs typeface="Arial" panose="020B0604020202020204" pitchFamily="34" charset="0"/>
+                  </a:rPr>
+                  <a:t>R2</a:t>
+                </a:r>
+              </a:p>
+            </p:txBody>
+          </p:sp>
+          <p:sp>
+            <p:nvSpPr>
+              <p:cNvPr id="105" name="TextBox 104">
+                <a:extLst>
+                  <a:ext uri="{FF2B5EF4-FFF2-40B4-BE49-F238E27FC236}">
+                    <a16:creationId xmlns:a16="http://schemas.microsoft.com/office/drawing/2014/main" id="{F01E6830-E41F-483B-99E3-A73A6AA2404C}"/>
+                  </a:ext>
+                </a:extLst>
+              </p:cNvPr>
+              <p:cNvSpPr txBox="1"/>
+              <p:nvPr/>
+            </p:nvSpPr>
+            <p:spPr>
+              <a:xfrm>
+                <a:off x="8623451" y="2088943"/>
+                <a:ext cx="242375" cy="230832"/>
+              </a:xfrm>
+              <a:prstGeom prst="rect">
+                <a:avLst/>
+              </a:prstGeom>
+              <a:noFill/>
+            </p:spPr>
+            <p:txBody>
+              <a:bodyPr wrap="none" rtlCol="0" anchor="ctr">
+                <a:spAutoFit/>
+              </a:bodyPr>
+              <a:lstStyle/>
+              <a:p>
+                <a:pPr algn="ctr"/>
+                <a:r>
+                  <a:rPr lang="en-AU" sz="900" dirty="0">
+                    <a:latin typeface="Arial" panose="020B0604020202020204" pitchFamily="34" charset="0"/>
+                    <a:cs typeface="Arial" panose="020B0604020202020204" pitchFamily="34" charset="0"/>
+                  </a:rPr>
+                  <a:t>x</a:t>
+                </a:r>
+              </a:p>
+            </p:txBody>
+          </p:sp>
+          <p:sp>
+            <p:nvSpPr>
+              <p:cNvPr id="106" name="TextBox 105">
+                <a:extLst>
+                  <a:ext uri="{FF2B5EF4-FFF2-40B4-BE49-F238E27FC236}">
+                    <a16:creationId xmlns:a16="http://schemas.microsoft.com/office/drawing/2014/main" id="{48C74C2D-65C0-4A9E-BB2F-181B0C14E706}"/>
+                  </a:ext>
+                </a:extLst>
+              </p:cNvPr>
+              <p:cNvSpPr txBox="1"/>
+              <p:nvPr/>
+            </p:nvSpPr>
+            <p:spPr>
+              <a:xfrm>
+                <a:off x="8803987" y="2088943"/>
+                <a:ext cx="332143" cy="230832"/>
+              </a:xfrm>
+              <a:prstGeom prst="rect">
+                <a:avLst/>
+              </a:prstGeom>
+              <a:noFill/>
+            </p:spPr>
+            <p:txBody>
+              <a:bodyPr wrap="none" rtlCol="0" anchor="ctr">
+                <a:spAutoFit/>
+              </a:bodyPr>
+              <a:lstStyle/>
+              <a:p>
+                <a:pPr algn="ctr"/>
+                <a:r>
+                  <a:rPr lang="en-AU" sz="900" dirty="0">
+                    <a:latin typeface="Arial" panose="020B0604020202020204" pitchFamily="34" charset="0"/>
+                    <a:cs typeface="Arial" panose="020B0604020202020204" pitchFamily="34" charset="0"/>
+                  </a:rPr>
+                  <a:t>FB</a:t>
+                </a:r>
+              </a:p>
+            </p:txBody>
+          </p:sp>
+          <p:sp>
+            <p:nvSpPr>
+              <p:cNvPr id="107" name="TextBox 106">
+                <a:extLst>
+                  <a:ext uri="{FF2B5EF4-FFF2-40B4-BE49-F238E27FC236}">
+                    <a16:creationId xmlns:a16="http://schemas.microsoft.com/office/drawing/2014/main" id="{567DE14E-5A63-4AA4-B9BE-94BE45216B05}"/>
+                  </a:ext>
+                </a:extLst>
+              </p:cNvPr>
+              <p:cNvSpPr txBox="1"/>
+              <p:nvPr/>
+            </p:nvSpPr>
+            <p:spPr>
+              <a:xfrm>
+                <a:off x="9019334" y="2088943"/>
+                <a:ext cx="332142" cy="230832"/>
+              </a:xfrm>
+              <a:prstGeom prst="rect">
+                <a:avLst/>
+              </a:prstGeom>
+              <a:noFill/>
+            </p:spPr>
+            <p:txBody>
+              <a:bodyPr wrap="none" rtlCol="0" anchor="ctr">
+                <a:spAutoFit/>
+              </a:bodyPr>
+              <a:lstStyle/>
+              <a:p>
+                <a:pPr algn="ctr"/>
+                <a:r>
+                  <a:rPr lang="en-AU" sz="900" dirty="0">
+                    <a:latin typeface="Arial" panose="020B0604020202020204" pitchFamily="34" charset="0"/>
+                    <a:cs typeface="Arial" panose="020B0604020202020204" pitchFamily="34" charset="0"/>
+                  </a:rPr>
+                  <a:t>N0</a:t>
+                </a:r>
+              </a:p>
+            </p:txBody>
+          </p:sp>
+          <p:sp>
+            <p:nvSpPr>
+              <p:cNvPr id="108" name="TextBox 107">
+                <a:extLst>
+                  <a:ext uri="{FF2B5EF4-FFF2-40B4-BE49-F238E27FC236}">
+                    <a16:creationId xmlns:a16="http://schemas.microsoft.com/office/drawing/2014/main" id="{1EEA8A9A-4266-4BE5-9CBA-E434EB7E8AE1}"/>
+                  </a:ext>
+                </a:extLst>
+              </p:cNvPr>
+              <p:cNvSpPr txBox="1"/>
+              <p:nvPr/>
+            </p:nvSpPr>
+            <p:spPr>
+              <a:xfrm>
+                <a:off x="9237470" y="2088943"/>
+                <a:ext cx="332142" cy="230832"/>
+              </a:xfrm>
+              <a:prstGeom prst="rect">
+                <a:avLst/>
+              </a:prstGeom>
+              <a:noFill/>
+            </p:spPr>
+            <p:txBody>
+              <a:bodyPr wrap="none" rtlCol="0" anchor="ctr">
+                <a:spAutoFit/>
+              </a:bodyPr>
+              <a:lstStyle/>
+              <a:p>
+                <a:pPr algn="ctr"/>
+                <a:r>
+                  <a:rPr lang="en-AU" sz="900" dirty="0">
+                    <a:latin typeface="Arial" panose="020B0604020202020204" pitchFamily="34" charset="0"/>
+                    <a:cs typeface="Arial" panose="020B0604020202020204" pitchFamily="34" charset="0"/>
+                  </a:rPr>
+                  <a:t>N1</a:t>
+                </a:r>
+              </a:p>
+            </p:txBody>
+          </p:sp>
+          <p:sp>
+            <p:nvSpPr>
+              <p:cNvPr id="99" name="TextBox 98">
+                <a:extLst>
+                  <a:ext uri="{FF2B5EF4-FFF2-40B4-BE49-F238E27FC236}">
+                    <a16:creationId xmlns:a16="http://schemas.microsoft.com/office/drawing/2014/main" id="{A358DF6B-8DE7-4928-8C88-F4498E9EBCDE}"/>
+                  </a:ext>
+                </a:extLst>
+              </p:cNvPr>
+              <p:cNvSpPr txBox="1"/>
+              <p:nvPr/>
+            </p:nvSpPr>
+            <p:spPr>
+              <a:xfrm>
+                <a:off x="7980940" y="1953063"/>
+                <a:ext cx="620683" cy="215444"/>
+              </a:xfrm>
+              <a:prstGeom prst="rect">
+                <a:avLst/>
+              </a:prstGeom>
+              <a:noFill/>
+            </p:spPr>
+            <p:txBody>
+              <a:bodyPr wrap="none" rtlCol="0">
+                <a:spAutoFit/>
+              </a:bodyPr>
+              <a:lstStyle/>
+              <a:p>
+                <a:pPr algn="ctr"/>
+                <a:r>
+                  <a:rPr lang="en-AU" sz="800" dirty="0">
+                    <a:latin typeface="Arial" panose="020B0604020202020204" pitchFamily="34" charset="0"/>
+                    <a:cs typeface="Arial" panose="020B0604020202020204" pitchFamily="34" charset="0"/>
+                  </a:rPr>
+                  <a:t>Reg </a:t>
+                </a:r>
+                <a:r>
+                  <a:rPr lang="en-AU" sz="800" dirty="0" err="1">
+                    <a:latin typeface="Arial" panose="020B0604020202020204" pitchFamily="34" charset="0"/>
+                    <a:cs typeface="Arial" panose="020B0604020202020204" pitchFamily="34" charset="0"/>
+                  </a:rPr>
+                  <a:t>Addr</a:t>
+                </a:r>
+                <a:endParaRPr lang="en-AU" sz="800" dirty="0">
+                  <a:latin typeface="Arial" panose="020B0604020202020204" pitchFamily="34" charset="0"/>
+                  <a:cs typeface="Arial" panose="020B0604020202020204" pitchFamily="34" charset="0"/>
+                </a:endParaRPr>
+              </a:p>
+            </p:txBody>
+          </p:sp>
+          <p:sp>
+            <p:nvSpPr>
+              <p:cNvPr id="104" name="TextBox 103">
+                <a:extLst>
+                  <a:ext uri="{FF2B5EF4-FFF2-40B4-BE49-F238E27FC236}">
+                    <a16:creationId xmlns:a16="http://schemas.microsoft.com/office/drawing/2014/main" id="{05B7C59A-4835-4B3D-9640-0E5C20BFE9E0}"/>
+                  </a:ext>
+                </a:extLst>
+              </p:cNvPr>
+              <p:cNvSpPr txBox="1"/>
+              <p:nvPr/>
+            </p:nvSpPr>
+            <p:spPr>
+              <a:xfrm>
+                <a:off x="9091333" y="1953063"/>
+                <a:ext cx="391454" cy="215444"/>
+              </a:xfrm>
+              <a:prstGeom prst="rect">
+                <a:avLst/>
+              </a:prstGeom>
+              <a:noFill/>
+            </p:spPr>
+            <p:txBody>
+              <a:bodyPr wrap="none" rtlCol="0">
+                <a:spAutoFit/>
+              </a:bodyPr>
+              <a:lstStyle/>
+              <a:p>
+                <a:pPr algn="ctr"/>
+                <a:r>
+                  <a:rPr lang="en-AU" sz="800" dirty="0">
+                    <a:latin typeface="Arial" panose="020B0604020202020204" pitchFamily="34" charset="0"/>
+                    <a:cs typeface="Arial" panose="020B0604020202020204" pitchFamily="34" charset="0"/>
+                  </a:rPr>
+                  <a:t>Shift</a:t>
+                </a:r>
+              </a:p>
+            </p:txBody>
+          </p:sp>
+        </p:grpSp>
+        <p:sp>
+          <p:nvSpPr>
+            <p:cNvPr id="149" name="TextBox 148">
+              <a:extLst>
+                <a:ext uri="{FF2B5EF4-FFF2-40B4-BE49-F238E27FC236}">
+                  <a16:creationId xmlns:a16="http://schemas.microsoft.com/office/drawing/2014/main" id="{89D43353-470B-445D-BC4B-9260D1ABF127}"/>
+                </a:ext>
+              </a:extLst>
+            </p:cNvPr>
+            <p:cNvSpPr txBox="1"/>
+            <p:nvPr/>
+          </p:nvSpPr>
+          <p:spPr>
+            <a:xfrm>
+              <a:off x="7654049" y="1728948"/>
+              <a:ext cx="1987532" cy="276999"/>
+            </a:xfrm>
+            <a:prstGeom prst="rect">
+              <a:avLst/>
+            </a:prstGeom>
+            <a:noFill/>
+          </p:spPr>
+          <p:txBody>
+            <a:bodyPr wrap="none" rtlCol="0">
+              <a:spAutoFit/>
+            </a:bodyPr>
+            <a:lstStyle/>
+            <a:p>
+              <a:r>
+                <a:rPr lang="en-AU" sz="1200" dirty="0"/>
+                <a:t>Noise Source Setting (1 byte)</a:t>
+              </a:r>
+            </a:p>
+          </p:txBody>
+        </p:sp>
+        <p:sp>
+          <p:nvSpPr>
+            <p:cNvPr id="152" name="TextBox 151">
+              <a:extLst>
+                <a:ext uri="{FF2B5EF4-FFF2-40B4-BE49-F238E27FC236}">
+                  <a16:creationId xmlns:a16="http://schemas.microsoft.com/office/drawing/2014/main" id="{3FB214AF-BF82-46D1-A710-ABE9AC68DB2E}"/>
+                </a:ext>
+              </a:extLst>
+            </p:cNvPr>
+            <p:cNvSpPr txBox="1"/>
+            <p:nvPr/>
+          </p:nvSpPr>
+          <p:spPr>
+            <a:xfrm>
+              <a:off x="7655510" y="2219858"/>
+              <a:ext cx="375424" cy="215444"/>
+            </a:xfrm>
+            <a:prstGeom prst="rect">
+              <a:avLst/>
+            </a:prstGeom>
+            <a:noFill/>
+          </p:spPr>
+          <p:txBody>
+            <a:bodyPr wrap="none" rtlCol="0">
+              <a:spAutoFit/>
+            </a:bodyPr>
+            <a:lstStyle/>
+            <a:p>
+              <a:r>
+                <a:rPr lang="en-AU" sz="800" dirty="0"/>
+                <a:t>MSB</a:t>
+              </a:r>
+            </a:p>
+          </p:txBody>
+        </p:sp>
+        <p:sp>
+          <p:nvSpPr>
+            <p:cNvPr id="157" name="TextBox 156">
+              <a:extLst>
+                <a:ext uri="{FF2B5EF4-FFF2-40B4-BE49-F238E27FC236}">
+                  <a16:creationId xmlns:a16="http://schemas.microsoft.com/office/drawing/2014/main" id="{F9EAC10C-CBBD-45E5-82DF-6E1471C83262}"/>
+                </a:ext>
+              </a:extLst>
+            </p:cNvPr>
+            <p:cNvSpPr txBox="1"/>
+            <p:nvPr/>
+          </p:nvSpPr>
+          <p:spPr>
+            <a:xfrm>
+              <a:off x="9275543" y="2219777"/>
+              <a:ext cx="330540" cy="215444"/>
+            </a:xfrm>
+            <a:prstGeom prst="rect">
+              <a:avLst/>
+            </a:prstGeom>
+            <a:noFill/>
+          </p:spPr>
+          <p:txBody>
+            <a:bodyPr wrap="none" rtlCol="0">
+              <a:spAutoFit/>
+            </a:bodyPr>
+            <a:lstStyle/>
+            <a:p>
+              <a:pPr algn="r"/>
+              <a:r>
+                <a:rPr lang="en-AU" sz="800" dirty="0"/>
+                <a:t>LSB</a:t>
+              </a:r>
+            </a:p>
+          </p:txBody>
+        </p:sp>
+      </p:grpSp>
+      <p:grpSp>
+        <p:nvGrpSpPr>
+          <p:cNvPr id="162" name="Group 161">
+            <a:extLst>
+              <a:ext uri="{FF2B5EF4-FFF2-40B4-BE49-F238E27FC236}">
+                <a16:creationId xmlns:a16="http://schemas.microsoft.com/office/drawing/2014/main" id="{8AE1157A-52CA-4089-BB47-EA710845A41C}"/>
+              </a:ext>
+            </a:extLst>
+          </p:cNvPr>
+          <p:cNvGrpSpPr/>
+          <p:nvPr/>
+        </p:nvGrpSpPr>
+        <p:grpSpPr>
+          <a:xfrm>
+            <a:off x="7652701" y="2431604"/>
+            <a:ext cx="2456763" cy="699454"/>
+            <a:chOff x="7652701" y="2431604"/>
+            <a:chExt cx="2456763" cy="699454"/>
+          </a:xfrm>
+        </p:grpSpPr>
+        <p:grpSp>
+          <p:nvGrpSpPr>
+            <p:cNvPr id="147" name="Group 146">
+              <a:extLst>
+                <a:ext uri="{FF2B5EF4-FFF2-40B4-BE49-F238E27FC236}">
+                  <a16:creationId xmlns:a16="http://schemas.microsoft.com/office/drawing/2014/main" id="{E822F789-25B5-4EAA-B0CE-204AD6DF3811}"/>
+                </a:ext>
+              </a:extLst>
+            </p:cNvPr>
+            <p:cNvGrpSpPr/>
+            <p:nvPr/>
+          </p:nvGrpSpPr>
+          <p:grpSpPr>
+            <a:xfrm>
+              <a:off x="7741583" y="2654282"/>
+              <a:ext cx="1825746" cy="366712"/>
+              <a:chOff x="7741583" y="2654282"/>
+              <a:chExt cx="1825746" cy="366712"/>
+            </a:xfrm>
+          </p:grpSpPr>
+          <p:grpSp>
+            <p:nvGrpSpPr>
+              <p:cNvPr id="128" name="Group 127">
+                <a:extLst>
+                  <a:ext uri="{FF2B5EF4-FFF2-40B4-BE49-F238E27FC236}">
+                    <a16:creationId xmlns:a16="http://schemas.microsoft.com/office/drawing/2014/main" id="{A80FAE83-8C56-411A-B1A5-FFB3629CA549}"/>
+                  </a:ext>
+                </a:extLst>
+              </p:cNvPr>
+              <p:cNvGrpSpPr/>
+              <p:nvPr/>
+            </p:nvGrpSpPr>
+            <p:grpSpPr>
+              <a:xfrm>
+                <a:off x="7751018" y="2694783"/>
+                <a:ext cx="1764604" cy="283100"/>
+                <a:chOff x="7750099" y="1289222"/>
+                <a:chExt cx="1764604" cy="283100"/>
+              </a:xfrm>
+            </p:grpSpPr>
+            <p:sp>
+              <p:nvSpPr>
+                <p:cNvPr id="129" name="Rectangle 128">
+                  <a:extLst>
+                    <a:ext uri="{FF2B5EF4-FFF2-40B4-BE49-F238E27FC236}">
+                      <a16:creationId xmlns:a16="http://schemas.microsoft.com/office/drawing/2014/main" id="{990F0A3E-9F3A-4A50-B47F-6FA86D94F78B}"/>
+                    </a:ext>
+                  </a:extLst>
+                </p:cNvPr>
+                <p:cNvSpPr/>
+                <p:nvPr/>
+              </p:nvSpPr>
+              <p:spPr>
+                <a:xfrm>
+                  <a:off x="7750099" y="1289425"/>
+                  <a:ext cx="1764604" cy="278781"/>
+                </a:xfrm>
+                <a:prstGeom prst="rect">
+                  <a:avLst/>
+                </a:prstGeom>
+                <a:ln>
+                  <a:solidFill>
+                    <a:schemeClr val="tx1"/>
+                  </a:solidFill>
+                </a:ln>
+              </p:spPr>
+              <p:style>
+                <a:lnRef idx="2">
+                  <a:schemeClr val="accent6"/>
+                </a:lnRef>
+                <a:fillRef idx="1">
+                  <a:schemeClr val="lt1"/>
+                </a:fillRef>
+                <a:effectRef idx="0">
+                  <a:schemeClr val="accent6"/>
+                </a:effectRef>
+                <a:fontRef idx="minor">
+                  <a:schemeClr val="dk1"/>
+                </a:fontRef>
+              </p:style>
+              <p:txBody>
+                <a:bodyPr rtlCol="0" anchor="ctr"/>
+                <a:lstStyle/>
+                <a:p>
+                  <a:pPr algn="ctr"/>
+                  <a:endParaRPr lang="en-AU"/>
+                </a:p>
+              </p:txBody>
+            </p:sp>
+            <p:cxnSp>
+              <p:nvCxnSpPr>
+                <p:cNvPr id="130" name="Straight Connector 129">
+                  <a:extLst>
+                    <a:ext uri="{FF2B5EF4-FFF2-40B4-BE49-F238E27FC236}">
+                      <a16:creationId xmlns:a16="http://schemas.microsoft.com/office/drawing/2014/main" id="{B1F39074-3D0C-45DC-9F6D-AE6C4751FA15}"/>
+                    </a:ext>
+                  </a:extLst>
+                </p:cNvPr>
+                <p:cNvCxnSpPr>
+                  <a:cxnSpLocks/>
+                </p:cNvCxnSpPr>
+                <p:nvPr/>
+              </p:nvCxnSpPr>
+              <p:spPr>
+                <a:xfrm>
+                  <a:off x="7970674" y="1289222"/>
+                  <a:ext cx="0" cy="283100"/>
+                </a:xfrm>
+                <a:prstGeom prst="line">
+                  <a:avLst/>
+                </a:prstGeom>
+                <a:ln>
+                  <a:solidFill>
+                    <a:schemeClr val="tx1"/>
+                  </a:solidFill>
+                </a:ln>
+              </p:spPr>
+              <p:style>
+                <a:lnRef idx="2">
+                  <a:schemeClr val="accent1"/>
+                </a:lnRef>
+                <a:fillRef idx="0">
+                  <a:schemeClr val="accent1"/>
+                </a:fillRef>
+                <a:effectRef idx="1">
+                  <a:schemeClr val="accent1"/>
+                </a:effectRef>
+                <a:fontRef idx="minor">
+                  <a:schemeClr val="tx1"/>
+                </a:fontRef>
+              </p:style>
+            </p:cxnSp>
+            <p:cxnSp>
+              <p:nvCxnSpPr>
+                <p:cNvPr id="131" name="Straight Connector 130">
+                  <a:extLst>
+                    <a:ext uri="{FF2B5EF4-FFF2-40B4-BE49-F238E27FC236}">
+                      <a16:creationId xmlns:a16="http://schemas.microsoft.com/office/drawing/2014/main" id="{185E4B8B-A2A9-4B49-B487-0A93DFAE2422}"/>
+                    </a:ext>
+                  </a:extLst>
+                </p:cNvPr>
+                <p:cNvCxnSpPr>
+                  <a:cxnSpLocks/>
+                </p:cNvCxnSpPr>
+                <p:nvPr/>
+              </p:nvCxnSpPr>
+              <p:spPr>
+                <a:xfrm>
+                  <a:off x="8191249" y="1515762"/>
+                  <a:ext cx="0" cy="56560"/>
+                </a:xfrm>
+                <a:prstGeom prst="line">
+                  <a:avLst/>
+                </a:prstGeom>
+                <a:ln>
+                  <a:solidFill>
+                    <a:schemeClr val="tx1"/>
+                  </a:solidFill>
+                </a:ln>
+              </p:spPr>
+              <p:style>
+                <a:lnRef idx="2">
+                  <a:schemeClr val="accent1"/>
+                </a:lnRef>
+                <a:fillRef idx="0">
+                  <a:schemeClr val="accent1"/>
+                </a:fillRef>
+                <a:effectRef idx="1">
+                  <a:schemeClr val="accent1"/>
+                </a:effectRef>
+                <a:fontRef idx="minor">
+                  <a:schemeClr val="tx1"/>
+                </a:fontRef>
+              </p:style>
+            </p:cxnSp>
+            <p:cxnSp>
+              <p:nvCxnSpPr>
+                <p:cNvPr id="132" name="Straight Connector 131">
+                  <a:extLst>
+                    <a:ext uri="{FF2B5EF4-FFF2-40B4-BE49-F238E27FC236}">
+                      <a16:creationId xmlns:a16="http://schemas.microsoft.com/office/drawing/2014/main" id="{4C3F0730-B73A-493C-866B-48628417429F}"/>
+                    </a:ext>
+                  </a:extLst>
+                </p:cNvPr>
+                <p:cNvCxnSpPr>
+                  <a:cxnSpLocks/>
+                </p:cNvCxnSpPr>
+                <p:nvPr/>
+              </p:nvCxnSpPr>
+              <p:spPr>
+                <a:xfrm>
+                  <a:off x="8411824" y="1515762"/>
+                  <a:ext cx="0" cy="56560"/>
+                </a:xfrm>
+                <a:prstGeom prst="line">
+                  <a:avLst/>
+                </a:prstGeom>
+                <a:ln>
+                  <a:solidFill>
+                    <a:schemeClr val="tx1"/>
+                  </a:solidFill>
+                </a:ln>
+              </p:spPr>
+              <p:style>
+                <a:lnRef idx="2">
+                  <a:schemeClr val="accent1"/>
+                </a:lnRef>
+                <a:fillRef idx="0">
+                  <a:schemeClr val="accent1"/>
+                </a:fillRef>
+                <a:effectRef idx="1">
+                  <a:schemeClr val="accent1"/>
+                </a:effectRef>
+                <a:fontRef idx="minor">
+                  <a:schemeClr val="tx1"/>
+                </a:fontRef>
+              </p:style>
+            </p:cxnSp>
+            <p:cxnSp>
+              <p:nvCxnSpPr>
+                <p:cNvPr id="133" name="Straight Connector 132">
+                  <a:extLst>
+                    <a:ext uri="{FF2B5EF4-FFF2-40B4-BE49-F238E27FC236}">
+                      <a16:creationId xmlns:a16="http://schemas.microsoft.com/office/drawing/2014/main" id="{2AF2CDD7-8F5F-4783-8D0E-954AE7B13179}"/>
+                    </a:ext>
+                  </a:extLst>
+                </p:cNvPr>
+                <p:cNvCxnSpPr>
+                  <a:cxnSpLocks/>
+                </p:cNvCxnSpPr>
+                <p:nvPr/>
+              </p:nvCxnSpPr>
+              <p:spPr>
+                <a:xfrm>
+                  <a:off x="8632399" y="1289222"/>
+                  <a:ext cx="0" cy="283100"/>
+                </a:xfrm>
+                <a:prstGeom prst="line">
+                  <a:avLst/>
+                </a:prstGeom>
+                <a:ln>
+                  <a:solidFill>
+                    <a:schemeClr val="tx1"/>
+                  </a:solidFill>
+                </a:ln>
+              </p:spPr>
+              <p:style>
+                <a:lnRef idx="2">
+                  <a:schemeClr val="accent1"/>
+                </a:lnRef>
+                <a:fillRef idx="0">
+                  <a:schemeClr val="accent1"/>
+                </a:fillRef>
+                <a:effectRef idx="1">
+                  <a:schemeClr val="accent1"/>
+                </a:effectRef>
+                <a:fontRef idx="minor">
+                  <a:schemeClr val="tx1"/>
+                </a:fontRef>
+              </p:style>
+            </p:cxnSp>
+            <p:cxnSp>
+              <p:nvCxnSpPr>
+                <p:cNvPr id="134" name="Straight Connector 133">
+                  <a:extLst>
+                    <a:ext uri="{FF2B5EF4-FFF2-40B4-BE49-F238E27FC236}">
+                      <a16:creationId xmlns:a16="http://schemas.microsoft.com/office/drawing/2014/main" id="{FFE27542-7867-46E5-BA77-0ACC8787AA49}"/>
+                    </a:ext>
+                  </a:extLst>
+                </p:cNvPr>
+                <p:cNvCxnSpPr>
+                  <a:cxnSpLocks/>
+                </p:cNvCxnSpPr>
+                <p:nvPr/>
+              </p:nvCxnSpPr>
+              <p:spPr>
+                <a:xfrm>
+                  <a:off x="8852975" y="1515762"/>
+                  <a:ext cx="0" cy="56560"/>
+                </a:xfrm>
+                <a:prstGeom prst="line">
+                  <a:avLst/>
+                </a:prstGeom>
+                <a:ln>
+                  <a:solidFill>
+                    <a:schemeClr val="tx1"/>
+                  </a:solidFill>
+                </a:ln>
+              </p:spPr>
+              <p:style>
+                <a:lnRef idx="2">
+                  <a:schemeClr val="accent1"/>
+                </a:lnRef>
+                <a:fillRef idx="0">
+                  <a:schemeClr val="accent1"/>
+                </a:fillRef>
+                <a:effectRef idx="1">
+                  <a:schemeClr val="accent1"/>
+                </a:effectRef>
+                <a:fontRef idx="minor">
+                  <a:schemeClr val="tx1"/>
+                </a:fontRef>
+              </p:style>
+            </p:cxnSp>
+            <p:cxnSp>
+              <p:nvCxnSpPr>
+                <p:cNvPr id="135" name="Straight Connector 134">
+                  <a:extLst>
+                    <a:ext uri="{FF2B5EF4-FFF2-40B4-BE49-F238E27FC236}">
+                      <a16:creationId xmlns:a16="http://schemas.microsoft.com/office/drawing/2014/main" id="{4F36CD36-112E-467F-A593-4C8A1D6635FF}"/>
+                    </a:ext>
+                  </a:extLst>
+                </p:cNvPr>
+                <p:cNvCxnSpPr>
+                  <a:cxnSpLocks/>
+                </p:cNvCxnSpPr>
+                <p:nvPr/>
+              </p:nvCxnSpPr>
+              <p:spPr>
+                <a:xfrm>
+                  <a:off x="9073551" y="1515762"/>
+                  <a:ext cx="0" cy="56560"/>
+                </a:xfrm>
+                <a:prstGeom prst="line">
+                  <a:avLst/>
+                </a:prstGeom>
+                <a:ln>
+                  <a:solidFill>
+                    <a:schemeClr val="tx1"/>
+                  </a:solidFill>
+                </a:ln>
+              </p:spPr>
+              <p:style>
+                <a:lnRef idx="2">
+                  <a:schemeClr val="accent1"/>
+                </a:lnRef>
+                <a:fillRef idx="0">
+                  <a:schemeClr val="accent1"/>
+                </a:fillRef>
+                <a:effectRef idx="1">
+                  <a:schemeClr val="accent1"/>
+                </a:effectRef>
+                <a:fontRef idx="minor">
+                  <a:schemeClr val="tx1"/>
+                </a:fontRef>
+              </p:style>
+            </p:cxnSp>
+            <p:cxnSp>
+              <p:nvCxnSpPr>
+                <p:cNvPr id="136" name="Straight Connector 135">
+                  <a:extLst>
+                    <a:ext uri="{FF2B5EF4-FFF2-40B4-BE49-F238E27FC236}">
+                      <a16:creationId xmlns:a16="http://schemas.microsoft.com/office/drawing/2014/main" id="{F9EE55A7-BF5A-4926-99EA-B13638A45B11}"/>
+                    </a:ext>
+                  </a:extLst>
+                </p:cNvPr>
+                <p:cNvCxnSpPr>
+                  <a:cxnSpLocks/>
+                </p:cNvCxnSpPr>
+                <p:nvPr/>
+              </p:nvCxnSpPr>
+              <p:spPr>
+                <a:xfrm>
+                  <a:off x="9294127" y="1515762"/>
+                  <a:ext cx="0" cy="56560"/>
+                </a:xfrm>
+                <a:prstGeom prst="line">
+                  <a:avLst/>
+                </a:prstGeom>
+                <a:ln>
+                  <a:solidFill>
+                    <a:schemeClr val="tx1"/>
+                  </a:solidFill>
+                </a:ln>
+              </p:spPr>
+              <p:style>
+                <a:lnRef idx="2">
+                  <a:schemeClr val="accent1"/>
+                </a:lnRef>
+                <a:fillRef idx="0">
+                  <a:schemeClr val="accent1"/>
+                </a:fillRef>
+                <a:effectRef idx="1">
+                  <a:schemeClr val="accent1"/>
+                </a:effectRef>
+                <a:fontRef idx="minor">
+                  <a:schemeClr val="tx1"/>
+                </a:fontRef>
+              </p:style>
+            </p:cxnSp>
+          </p:grpSp>
+          <p:sp>
+            <p:nvSpPr>
+              <p:cNvPr id="137" name="TextBox 136">
+                <a:extLst>
+                  <a:ext uri="{FF2B5EF4-FFF2-40B4-BE49-F238E27FC236}">
+                    <a16:creationId xmlns:a16="http://schemas.microsoft.com/office/drawing/2014/main" id="{5BD1B370-0829-43C1-BEA9-49AF512D49D3}"/>
+                  </a:ext>
+                </a:extLst>
+              </p:cNvPr>
+              <p:cNvSpPr txBox="1"/>
+              <p:nvPr/>
+            </p:nvSpPr>
+            <p:spPr>
+              <a:xfrm>
+                <a:off x="7981862" y="2654282"/>
+                <a:ext cx="620683" cy="215444"/>
+              </a:xfrm>
+              <a:prstGeom prst="rect">
+                <a:avLst/>
+              </a:prstGeom>
+              <a:noFill/>
+            </p:spPr>
+            <p:txBody>
+              <a:bodyPr wrap="none" rtlCol="0">
+                <a:spAutoFit/>
+              </a:bodyPr>
+              <a:lstStyle/>
+              <a:p>
+                <a:pPr algn="ctr"/>
+                <a:r>
+                  <a:rPr lang="en-AU" sz="800" dirty="0">
+                    <a:latin typeface="Arial" panose="020B0604020202020204" pitchFamily="34" charset="0"/>
+                    <a:cs typeface="Arial" panose="020B0604020202020204" pitchFamily="34" charset="0"/>
+                  </a:rPr>
+                  <a:t>Reg </a:t>
+                </a:r>
+                <a:r>
+                  <a:rPr lang="en-AU" sz="800" dirty="0" err="1">
+                    <a:latin typeface="Arial" panose="020B0604020202020204" pitchFamily="34" charset="0"/>
+                    <a:cs typeface="Arial" panose="020B0604020202020204" pitchFamily="34" charset="0"/>
+                  </a:rPr>
+                  <a:t>Addr</a:t>
+                </a:r>
+                <a:endParaRPr lang="en-AU" sz="800" dirty="0">
+                  <a:latin typeface="Arial" panose="020B0604020202020204" pitchFamily="34" charset="0"/>
+                  <a:cs typeface="Arial" panose="020B0604020202020204" pitchFamily="34" charset="0"/>
+                </a:endParaRPr>
+              </a:p>
+            </p:txBody>
+          </p:sp>
+          <p:sp>
+            <p:nvSpPr>
+              <p:cNvPr id="138" name="TextBox 137">
+                <a:extLst>
+                  <a:ext uri="{FF2B5EF4-FFF2-40B4-BE49-F238E27FC236}">
+                    <a16:creationId xmlns:a16="http://schemas.microsoft.com/office/drawing/2014/main" id="{452AD098-B3DB-437D-B838-A44399BC4058}"/>
+                  </a:ext>
+                </a:extLst>
+              </p:cNvPr>
+              <p:cNvSpPr txBox="1"/>
+              <p:nvPr/>
+            </p:nvSpPr>
+            <p:spPr>
+              <a:xfrm>
+                <a:off x="7741583" y="2790162"/>
+                <a:ext cx="248786" cy="230832"/>
+              </a:xfrm>
+              <a:prstGeom prst="rect">
+                <a:avLst/>
+              </a:prstGeom>
+              <a:noFill/>
+            </p:spPr>
+            <p:txBody>
+              <a:bodyPr wrap="none" rtlCol="0" anchor="ctr">
+                <a:spAutoFit/>
+              </a:bodyPr>
+              <a:lstStyle/>
+              <a:p>
+                <a:pPr algn="ctr"/>
+                <a:r>
+                  <a:rPr lang="en-AU" sz="900" dirty="0">
+                    <a:latin typeface="Arial" panose="020B0604020202020204" pitchFamily="34" charset="0"/>
+                    <a:cs typeface="Arial" panose="020B0604020202020204" pitchFamily="34" charset="0"/>
+                  </a:rPr>
+                  <a:t>1</a:t>
+                </a:r>
+              </a:p>
+            </p:txBody>
+          </p:sp>
+          <p:sp>
+            <p:nvSpPr>
+              <p:cNvPr id="139" name="TextBox 138">
+                <a:extLst>
+                  <a:ext uri="{FF2B5EF4-FFF2-40B4-BE49-F238E27FC236}">
+                    <a16:creationId xmlns:a16="http://schemas.microsoft.com/office/drawing/2014/main" id="{D9CA1500-5F59-4698-98C5-7988364BAFC3}"/>
+                  </a:ext>
+                </a:extLst>
+              </p:cNvPr>
+              <p:cNvSpPr txBox="1"/>
+              <p:nvPr/>
+            </p:nvSpPr>
+            <p:spPr>
+              <a:xfrm>
+                <a:off x="7917094" y="2790162"/>
+                <a:ext cx="332142" cy="230832"/>
+              </a:xfrm>
+              <a:prstGeom prst="rect">
+                <a:avLst/>
+              </a:prstGeom>
+              <a:noFill/>
+            </p:spPr>
+            <p:txBody>
+              <a:bodyPr wrap="none" rtlCol="0" anchor="ctr">
+                <a:spAutoFit/>
+              </a:bodyPr>
+              <a:lstStyle/>
+              <a:p>
+                <a:pPr algn="ctr"/>
+                <a:r>
+                  <a:rPr lang="en-AU" sz="900" dirty="0">
+                    <a:latin typeface="Arial" panose="020B0604020202020204" pitchFamily="34" charset="0"/>
+                    <a:cs typeface="Arial" panose="020B0604020202020204" pitchFamily="34" charset="0"/>
+                  </a:rPr>
+                  <a:t>R0</a:t>
+                </a:r>
+              </a:p>
+            </p:txBody>
+          </p:sp>
+          <p:sp>
+            <p:nvSpPr>
+              <p:cNvPr id="140" name="TextBox 139">
+                <a:extLst>
+                  <a:ext uri="{FF2B5EF4-FFF2-40B4-BE49-F238E27FC236}">
+                    <a16:creationId xmlns:a16="http://schemas.microsoft.com/office/drawing/2014/main" id="{B16DBD81-9FD2-410B-86D0-1E0A591C3788}"/>
+                  </a:ext>
+                </a:extLst>
+              </p:cNvPr>
+              <p:cNvSpPr txBox="1"/>
+              <p:nvPr/>
+            </p:nvSpPr>
+            <p:spPr>
+              <a:xfrm>
+                <a:off x="8142143" y="2790162"/>
+                <a:ext cx="332143" cy="230832"/>
+              </a:xfrm>
+              <a:prstGeom prst="rect">
+                <a:avLst/>
+              </a:prstGeom>
+              <a:noFill/>
+            </p:spPr>
+            <p:txBody>
+              <a:bodyPr wrap="none" rtlCol="0" anchor="ctr">
+                <a:spAutoFit/>
+              </a:bodyPr>
+              <a:lstStyle/>
+              <a:p>
+                <a:pPr algn="ctr"/>
+                <a:r>
+                  <a:rPr lang="en-AU" sz="900" dirty="0">
+                    <a:latin typeface="Arial" panose="020B0604020202020204" pitchFamily="34" charset="0"/>
+                    <a:cs typeface="Arial" panose="020B0604020202020204" pitchFamily="34" charset="0"/>
+                  </a:rPr>
+                  <a:t>R1</a:t>
+                </a:r>
+              </a:p>
+            </p:txBody>
+          </p:sp>
+          <p:sp>
+            <p:nvSpPr>
+              <p:cNvPr id="141" name="TextBox 140">
+                <a:extLst>
+                  <a:ext uri="{FF2B5EF4-FFF2-40B4-BE49-F238E27FC236}">
+                    <a16:creationId xmlns:a16="http://schemas.microsoft.com/office/drawing/2014/main" id="{DC530FF9-4421-4A93-889C-E73F01D31602}"/>
+                  </a:ext>
+                </a:extLst>
+              </p:cNvPr>
+              <p:cNvSpPr txBox="1"/>
+              <p:nvPr/>
+            </p:nvSpPr>
+            <p:spPr>
+              <a:xfrm>
+                <a:off x="8350127" y="2790162"/>
+                <a:ext cx="332143" cy="230832"/>
+              </a:xfrm>
+              <a:prstGeom prst="rect">
+                <a:avLst/>
+              </a:prstGeom>
+              <a:noFill/>
+            </p:spPr>
+            <p:txBody>
+              <a:bodyPr wrap="none" rtlCol="0" anchor="ctr">
+                <a:spAutoFit/>
+              </a:bodyPr>
+              <a:lstStyle/>
+              <a:p>
+                <a:pPr algn="ctr"/>
+                <a:r>
+                  <a:rPr lang="en-AU" sz="900" dirty="0">
+                    <a:latin typeface="Arial" panose="020B0604020202020204" pitchFamily="34" charset="0"/>
+                    <a:cs typeface="Arial" panose="020B0604020202020204" pitchFamily="34" charset="0"/>
+                  </a:rPr>
+                  <a:t>R2</a:t>
+                </a:r>
+              </a:p>
+            </p:txBody>
+          </p:sp>
+          <p:sp>
+            <p:nvSpPr>
+              <p:cNvPr id="142" name="TextBox 141">
+                <a:extLst>
+                  <a:ext uri="{FF2B5EF4-FFF2-40B4-BE49-F238E27FC236}">
+                    <a16:creationId xmlns:a16="http://schemas.microsoft.com/office/drawing/2014/main" id="{660F0084-F257-4D87-BACB-4573C7E056D1}"/>
+                  </a:ext>
+                </a:extLst>
+              </p:cNvPr>
+              <p:cNvSpPr txBox="1"/>
+              <p:nvPr/>
+            </p:nvSpPr>
+            <p:spPr>
+              <a:xfrm>
+                <a:off x="8615064" y="2654282"/>
+                <a:ext cx="909223" cy="215444"/>
+              </a:xfrm>
+              <a:prstGeom prst="rect">
+                <a:avLst/>
+              </a:prstGeom>
+              <a:noFill/>
+            </p:spPr>
+            <p:txBody>
+              <a:bodyPr wrap="none" rtlCol="0">
+                <a:spAutoFit/>
+              </a:bodyPr>
+              <a:lstStyle/>
+              <a:p>
+                <a:pPr algn="ctr"/>
+                <a:r>
+                  <a:rPr lang="en-AU" sz="800" dirty="0">
+                    <a:latin typeface="Arial" panose="020B0604020202020204" pitchFamily="34" charset="0"/>
+                    <a:cs typeface="Arial" panose="020B0604020202020204" pitchFamily="34" charset="0"/>
+                  </a:rPr>
+                  <a:t>Attenuator Data</a:t>
+                </a:r>
+              </a:p>
+            </p:txBody>
+          </p:sp>
+          <p:sp>
+            <p:nvSpPr>
+              <p:cNvPr id="143" name="TextBox 142">
+                <a:extLst>
+                  <a:ext uri="{FF2B5EF4-FFF2-40B4-BE49-F238E27FC236}">
+                    <a16:creationId xmlns:a16="http://schemas.microsoft.com/office/drawing/2014/main" id="{118210EB-B4C9-4939-98D4-3D0F9235A4BA}"/>
+                  </a:ext>
+                </a:extLst>
+              </p:cNvPr>
+              <p:cNvSpPr txBox="1"/>
+              <p:nvPr/>
+            </p:nvSpPr>
+            <p:spPr>
+              <a:xfrm>
+                <a:off x="8582696" y="2790162"/>
+                <a:ext cx="325730" cy="230832"/>
+              </a:xfrm>
+              <a:prstGeom prst="rect">
+                <a:avLst/>
+              </a:prstGeom>
+              <a:noFill/>
+            </p:spPr>
+            <p:txBody>
+              <a:bodyPr wrap="none" rtlCol="0" anchor="ctr">
+                <a:spAutoFit/>
+              </a:bodyPr>
+              <a:lstStyle/>
+              <a:p>
+                <a:pPr algn="ctr"/>
+                <a:r>
+                  <a:rPr lang="en-AU" sz="900" dirty="0">
+                    <a:latin typeface="Arial" panose="020B0604020202020204" pitchFamily="34" charset="0"/>
+                    <a:cs typeface="Arial" panose="020B0604020202020204" pitchFamily="34" charset="0"/>
+                  </a:rPr>
+                  <a:t>A0</a:t>
+                </a:r>
+              </a:p>
+            </p:txBody>
+          </p:sp>
+          <p:sp>
+            <p:nvSpPr>
+              <p:cNvPr id="144" name="TextBox 143">
+                <a:extLst>
+                  <a:ext uri="{FF2B5EF4-FFF2-40B4-BE49-F238E27FC236}">
+                    <a16:creationId xmlns:a16="http://schemas.microsoft.com/office/drawing/2014/main" id="{EEDC663C-5930-491F-8026-1AC4FDC903C3}"/>
+                  </a:ext>
+                </a:extLst>
+              </p:cNvPr>
+              <p:cNvSpPr txBox="1"/>
+              <p:nvPr/>
+            </p:nvSpPr>
+            <p:spPr>
+              <a:xfrm>
+                <a:off x="8808115" y="2790162"/>
+                <a:ext cx="325730" cy="230832"/>
+              </a:xfrm>
+              <a:prstGeom prst="rect">
+                <a:avLst/>
+              </a:prstGeom>
+              <a:noFill/>
+            </p:spPr>
+            <p:txBody>
+              <a:bodyPr wrap="none" rtlCol="0" anchor="ctr">
+                <a:spAutoFit/>
+              </a:bodyPr>
+              <a:lstStyle/>
+              <a:p>
+                <a:pPr algn="ctr"/>
+                <a:r>
+                  <a:rPr lang="en-AU" sz="900" dirty="0">
+                    <a:latin typeface="Arial" panose="020B0604020202020204" pitchFamily="34" charset="0"/>
+                    <a:cs typeface="Arial" panose="020B0604020202020204" pitchFamily="34" charset="0"/>
+                  </a:rPr>
+                  <a:t>A1</a:t>
+                </a:r>
+              </a:p>
+            </p:txBody>
+          </p:sp>
+          <p:sp>
+            <p:nvSpPr>
+              <p:cNvPr id="145" name="TextBox 144">
+                <a:extLst>
+                  <a:ext uri="{FF2B5EF4-FFF2-40B4-BE49-F238E27FC236}">
+                    <a16:creationId xmlns:a16="http://schemas.microsoft.com/office/drawing/2014/main" id="{1A76C689-E1F1-408D-93DB-9D58DC81C1A0}"/>
+                  </a:ext>
+                </a:extLst>
+              </p:cNvPr>
+              <p:cNvSpPr txBox="1"/>
+              <p:nvPr/>
+            </p:nvSpPr>
+            <p:spPr>
+              <a:xfrm>
+                <a:off x="9023463" y="2790162"/>
+                <a:ext cx="325730" cy="230832"/>
+              </a:xfrm>
+              <a:prstGeom prst="rect">
+                <a:avLst/>
+              </a:prstGeom>
+              <a:noFill/>
+            </p:spPr>
+            <p:txBody>
+              <a:bodyPr wrap="none" rtlCol="0" anchor="ctr">
+                <a:spAutoFit/>
+              </a:bodyPr>
+              <a:lstStyle/>
+              <a:p>
+                <a:pPr algn="ctr"/>
+                <a:r>
+                  <a:rPr lang="en-AU" sz="900" dirty="0">
+                    <a:latin typeface="Arial" panose="020B0604020202020204" pitchFamily="34" charset="0"/>
+                    <a:cs typeface="Arial" panose="020B0604020202020204" pitchFamily="34" charset="0"/>
+                  </a:rPr>
+                  <a:t>A2</a:t>
+                </a:r>
+              </a:p>
+            </p:txBody>
+          </p:sp>
+          <p:sp>
+            <p:nvSpPr>
+              <p:cNvPr id="146" name="TextBox 145">
+                <a:extLst>
+                  <a:ext uri="{FF2B5EF4-FFF2-40B4-BE49-F238E27FC236}">
+                    <a16:creationId xmlns:a16="http://schemas.microsoft.com/office/drawing/2014/main" id="{EB87EE8E-497F-483C-8C02-E220BA85AD04}"/>
+                  </a:ext>
+                </a:extLst>
+              </p:cNvPr>
+              <p:cNvSpPr txBox="1"/>
+              <p:nvPr/>
+            </p:nvSpPr>
+            <p:spPr>
+              <a:xfrm>
+                <a:off x="9241599" y="2790162"/>
+                <a:ext cx="325730" cy="230832"/>
+              </a:xfrm>
+              <a:prstGeom prst="rect">
+                <a:avLst/>
+              </a:prstGeom>
+              <a:noFill/>
+            </p:spPr>
+            <p:txBody>
+              <a:bodyPr wrap="none" rtlCol="0" anchor="ctr">
+                <a:spAutoFit/>
+              </a:bodyPr>
+              <a:lstStyle/>
+              <a:p>
+                <a:pPr algn="ctr"/>
+                <a:r>
+                  <a:rPr lang="en-AU" sz="900" dirty="0">
+                    <a:latin typeface="Arial" panose="020B0604020202020204" pitchFamily="34" charset="0"/>
+                    <a:cs typeface="Arial" panose="020B0604020202020204" pitchFamily="34" charset="0"/>
+                  </a:rPr>
+                  <a:t>A3</a:t>
+                </a:r>
+              </a:p>
+            </p:txBody>
+          </p:sp>
+        </p:grpSp>
+        <p:sp>
+          <p:nvSpPr>
+            <p:cNvPr id="150" name="TextBox 149">
+              <a:extLst>
+                <a:ext uri="{FF2B5EF4-FFF2-40B4-BE49-F238E27FC236}">
+                  <a16:creationId xmlns:a16="http://schemas.microsoft.com/office/drawing/2014/main" id="{AA032F62-C65D-4A22-8B28-F632C246AD8A}"/>
+                </a:ext>
+              </a:extLst>
+            </p:cNvPr>
+            <p:cNvSpPr txBox="1"/>
+            <p:nvPr/>
+          </p:nvSpPr>
+          <p:spPr>
+            <a:xfrm>
+              <a:off x="7652701" y="2431604"/>
+              <a:ext cx="2456763" cy="276999"/>
+            </a:xfrm>
+            <a:prstGeom prst="rect">
+              <a:avLst/>
+            </a:prstGeom>
+            <a:noFill/>
+          </p:spPr>
+          <p:txBody>
+            <a:bodyPr wrap="none" rtlCol="0">
+              <a:spAutoFit/>
+            </a:bodyPr>
+            <a:lstStyle/>
+            <a:p>
+              <a:r>
+                <a:rPr lang="en-AU" sz="1200" dirty="0"/>
+                <a:t>Attenuator (Volume) Setting (1 byte)</a:t>
+              </a:r>
+            </a:p>
+          </p:txBody>
+        </p:sp>
+        <p:sp>
+          <p:nvSpPr>
+            <p:cNvPr id="153" name="TextBox 152">
+              <a:extLst>
+                <a:ext uri="{FF2B5EF4-FFF2-40B4-BE49-F238E27FC236}">
+                  <a16:creationId xmlns:a16="http://schemas.microsoft.com/office/drawing/2014/main" id="{A321AC81-1042-4424-B445-E8AD66857C5B}"/>
+                </a:ext>
+              </a:extLst>
+            </p:cNvPr>
+            <p:cNvSpPr txBox="1"/>
+            <p:nvPr/>
+          </p:nvSpPr>
+          <p:spPr>
+            <a:xfrm>
+              <a:off x="7657985" y="2915614"/>
+              <a:ext cx="375424" cy="215444"/>
+            </a:xfrm>
+            <a:prstGeom prst="rect">
+              <a:avLst/>
+            </a:prstGeom>
+            <a:noFill/>
+          </p:spPr>
+          <p:txBody>
+            <a:bodyPr wrap="none" rtlCol="0">
+              <a:spAutoFit/>
+            </a:bodyPr>
+            <a:lstStyle/>
+            <a:p>
+              <a:r>
+                <a:rPr lang="en-AU" sz="800" dirty="0"/>
+                <a:t>MSB</a:t>
+              </a:r>
+            </a:p>
+          </p:txBody>
+        </p:sp>
+        <p:sp>
+          <p:nvSpPr>
+            <p:cNvPr id="158" name="TextBox 157">
+              <a:extLst>
+                <a:ext uri="{FF2B5EF4-FFF2-40B4-BE49-F238E27FC236}">
+                  <a16:creationId xmlns:a16="http://schemas.microsoft.com/office/drawing/2014/main" id="{722146E3-6301-40B8-9CE4-E2DE33D9C0EF}"/>
+                </a:ext>
+              </a:extLst>
+            </p:cNvPr>
+            <p:cNvSpPr txBox="1"/>
+            <p:nvPr/>
+          </p:nvSpPr>
+          <p:spPr>
+            <a:xfrm>
+              <a:off x="9275385" y="2913966"/>
+              <a:ext cx="330540" cy="215444"/>
+            </a:xfrm>
+            <a:prstGeom prst="rect">
+              <a:avLst/>
+            </a:prstGeom>
+            <a:noFill/>
+          </p:spPr>
+          <p:txBody>
+            <a:bodyPr wrap="none" rtlCol="0">
+              <a:spAutoFit/>
+            </a:bodyPr>
+            <a:lstStyle/>
+            <a:p>
+              <a:pPr algn="r"/>
+              <a:r>
+                <a:rPr lang="en-AU" sz="800" dirty="0"/>
+                <a:t>LSB</a:t>
+              </a:r>
+            </a:p>
+          </p:txBody>
+        </p:sp>
+      </p:grpSp>
     </p:spTree>
     <p:extLst>
       <p:ext uri="{BB962C8B-B14F-4D97-AF65-F5344CB8AC3E}">

</xml_diff>